<commit_message>
* am243x/am64x: Doc: Updated the Release notes section for 9.0 release
Signed-off-by: Prajith Jayarajan <prajith@ti.com>
</commit_message>
<xml_diff>
--- a/docs_src/docs/api_guide/images/images.pptx
+++ b/docs_src/docs/api_guide/images/images.pptx
@@ -253,7 +253,7 @@
           <a:p>
             <a:fld id="{4ADF24D4-082E-4F97-B9C4-E0764843ED08}" type="datetimeFigureOut">
               <a:rPr lang="en-US" smtClean="0"/>
-              <a:t>9/6/2023</a:t>
+              <a:t>9/8/2023</a:t>
             </a:fld>
             <a:endParaRPr lang="en-US"/>
           </a:p>
@@ -3844,8 +3844,8 @@
         </p:nvSpPr>
         <p:spPr>
           <a:xfrm>
-            <a:off x="2122588" y="2481418"/>
-            <a:ext cx="596853" cy="314308"/>
+            <a:off x="2013589" y="2490666"/>
+            <a:ext cx="587485" cy="314308"/>
           </a:xfrm>
           <a:prstGeom prst="rect">
             <a:avLst/>
@@ -4426,8 +4426,8 @@
         </p:nvSpPr>
         <p:spPr>
           <a:xfrm>
-            <a:off x="1487103" y="2480124"/>
-            <a:ext cx="596853" cy="313537"/>
+            <a:off x="1397592" y="2481330"/>
+            <a:ext cx="587485" cy="313537"/>
           </a:xfrm>
           <a:prstGeom prst="rect">
             <a:avLst/>
@@ -5334,8 +5334,8 @@
         </p:nvSpPr>
         <p:spPr>
           <a:xfrm>
-            <a:off x="3392856" y="2481555"/>
-            <a:ext cx="633700" cy="310587"/>
+            <a:off x="3644727" y="2481330"/>
+            <a:ext cx="596853" cy="310587"/>
           </a:xfrm>
           <a:prstGeom prst="rect">
             <a:avLst/>
@@ -5416,8 +5416,8 @@
         </p:nvSpPr>
         <p:spPr>
           <a:xfrm>
-            <a:off x="4070807" y="2484020"/>
-            <a:ext cx="642785" cy="315079"/>
+            <a:off x="4289404" y="2490666"/>
+            <a:ext cx="598130" cy="315079"/>
           </a:xfrm>
           <a:prstGeom prst="rect">
             <a:avLst/>
@@ -5498,8 +5498,8 @@
         </p:nvSpPr>
         <p:spPr>
           <a:xfrm>
-            <a:off x="5416555" y="2480343"/>
-            <a:ext cx="596852" cy="315079"/>
+            <a:off x="5492957" y="2477660"/>
+            <a:ext cx="598130" cy="315079"/>
           </a:xfrm>
           <a:prstGeom prst="rect">
             <a:avLst/>
@@ -5698,7 +5698,7 @@
               <a:t>EtherNet</a:t>
             </a:r>
             <a:r>
-              <a:rPr lang="en-US" sz="800" spc="-1">
+              <a:rPr lang="en-US" sz="800" spc="-1" dirty="0">
                 <a:solidFill>
                   <a:srgbClr val="000000"/>
                 </a:solidFill>
@@ -5957,8 +5957,8 @@
         </p:nvSpPr>
         <p:spPr>
           <a:xfrm>
-            <a:off x="4757843" y="2477660"/>
-            <a:ext cx="616981" cy="310587"/>
+            <a:off x="4913845" y="2477660"/>
+            <a:ext cx="552801" cy="310587"/>
           </a:xfrm>
           <a:prstGeom prst="rect">
             <a:avLst/>
@@ -7077,8 +7077,294 @@
         </p:nvSpPr>
         <p:spPr>
           <a:xfrm>
-            <a:off x="2757722" y="2479353"/>
-            <a:ext cx="596853" cy="314308"/>
+            <a:off x="3147633" y="2481061"/>
+            <a:ext cx="476185" cy="314308"/>
+          </a:xfrm>
+          <a:prstGeom prst="rect">
+            <a:avLst/>
+          </a:prstGeom>
+          <a:solidFill>
+            <a:srgbClr val="92D050"/>
+          </a:solidFill>
+          <a:ln>
+            <a:noFill/>
+          </a:ln>
+          <a:effectLst>
+            <a:outerShdw blurRad="50760" dist="37674" dir="2700000" algn="tl" rotWithShape="0">
+              <a:srgbClr val="000000">
+                <a:alpha val="40000"/>
+              </a:srgbClr>
+            </a:outerShdw>
+          </a:effectLst>
+        </p:spPr>
+        <p:style>
+          <a:lnRef idx="2">
+            <a:schemeClr val="accent1">
+              <a:shade val="50000"/>
+            </a:schemeClr>
+          </a:lnRef>
+          <a:fillRef idx="1">
+            <a:schemeClr val="accent1"/>
+          </a:fillRef>
+          <a:effectRef idx="0">
+            <a:schemeClr val="accent1"/>
+          </a:effectRef>
+          <a:fontRef idx="minor"/>
+        </p:style>
+        <p:txBody>
+          <a:bodyPr lIns="56250" tIns="28125" rIns="56250" bIns="28125" anchor="ctr">
+            <a:noAutofit/>
+          </a:bodyPr>
+          <a:lstStyle/>
+          <a:p>
+            <a:pPr algn="ctr"/>
+            <a:r>
+              <a:rPr lang="en-US" sz="800" spc="-1" dirty="0">
+                <a:latin typeface="Arial"/>
+              </a:rPr>
+              <a:t>ICSS EMAC</a:t>
+            </a:r>
+            <a:endParaRPr lang="en-IN" sz="800" spc="-1" dirty="0">
+              <a:latin typeface="Arial"/>
+            </a:endParaRPr>
+          </a:p>
+        </p:txBody>
+      </p:sp>
+      <p:sp>
+        <p:nvSpPr>
+          <p:cNvPr id="60" name="CustomShape 8">
+            <a:extLst>
+              <a:ext uri="{FF2B5EF4-FFF2-40B4-BE49-F238E27FC236}">
+                <a16:creationId xmlns:a16="http://schemas.microsoft.com/office/drawing/2014/main" id="{AFCA26DE-C2C0-4726-B3B8-382C307C9245}"/>
+              </a:ext>
+            </a:extLst>
+          </p:cNvPr>
+          <p:cNvSpPr/>
+          <p:nvPr/>
+        </p:nvSpPr>
+        <p:spPr>
+          <a:xfrm>
+            <a:off x="2258652" y="988313"/>
+            <a:ext cx="501076" cy="281025"/>
+          </a:xfrm>
+          <a:prstGeom prst="rect">
+            <a:avLst/>
+          </a:prstGeom>
+          <a:solidFill>
+            <a:srgbClr val="92D050"/>
+          </a:solidFill>
+          <a:ln>
+            <a:noFill/>
+          </a:ln>
+          <a:effectLst>
+            <a:outerShdw blurRad="50760" dist="37674" dir="2700000" algn="tl" rotWithShape="0">
+              <a:srgbClr val="000000">
+                <a:alpha val="40000"/>
+              </a:srgbClr>
+            </a:outerShdw>
+          </a:effectLst>
+        </p:spPr>
+        <p:style>
+          <a:lnRef idx="2">
+            <a:schemeClr val="accent1">
+              <a:shade val="50000"/>
+            </a:schemeClr>
+          </a:lnRef>
+          <a:fillRef idx="1">
+            <a:schemeClr val="accent1"/>
+          </a:fillRef>
+          <a:effectRef idx="0">
+            <a:schemeClr val="accent1"/>
+          </a:effectRef>
+          <a:fontRef idx="minor"/>
+        </p:style>
+        <p:txBody>
+          <a:bodyPr lIns="56250" tIns="28125" rIns="56250" bIns="28125" anchor="ctr">
+            <a:noAutofit/>
+          </a:bodyPr>
+          <a:lstStyle/>
+          <a:p>
+            <a:pPr algn="ctr"/>
+            <a:r>
+              <a:rPr lang="en-US" sz="800" spc="-1" dirty="0">
+                <a:solidFill>
+                  <a:srgbClr val="000000"/>
+                </a:solidFill>
+              </a:rPr>
+              <a:t>IOLINK</a:t>
+            </a:r>
+            <a:endParaRPr lang="en-IN" sz="800" spc="-1" dirty="0">
+              <a:solidFill>
+                <a:srgbClr val="000000"/>
+              </a:solidFill>
+              <a:latin typeface="Arial"/>
+            </a:endParaRPr>
+          </a:p>
+        </p:txBody>
+      </p:sp>
+      <p:sp>
+        <p:nvSpPr>
+          <p:cNvPr id="61" name="CustomShape 8">
+            <a:extLst>
+              <a:ext uri="{FF2B5EF4-FFF2-40B4-BE49-F238E27FC236}">
+                <a16:creationId xmlns:a16="http://schemas.microsoft.com/office/drawing/2014/main" id="{BD18885D-0591-4655-9751-9A6EE4B0C3ED}"/>
+              </a:ext>
+            </a:extLst>
+          </p:cNvPr>
+          <p:cNvSpPr/>
+          <p:nvPr/>
+        </p:nvSpPr>
+        <p:spPr>
+          <a:xfrm>
+            <a:off x="5346752" y="824037"/>
+            <a:ext cx="739983" cy="281025"/>
+          </a:xfrm>
+          <a:prstGeom prst="rect">
+            <a:avLst/>
+          </a:prstGeom>
+          <a:solidFill>
+            <a:srgbClr val="92D050"/>
+          </a:solidFill>
+          <a:ln>
+            <a:noFill/>
+          </a:ln>
+          <a:effectLst>
+            <a:outerShdw blurRad="50760" dist="37674" dir="2700000" algn="tl" rotWithShape="0">
+              <a:srgbClr val="000000">
+                <a:alpha val="40000"/>
+              </a:srgbClr>
+            </a:outerShdw>
+          </a:effectLst>
+        </p:spPr>
+        <p:style>
+          <a:lnRef idx="2">
+            <a:schemeClr val="accent1">
+              <a:shade val="50000"/>
+            </a:schemeClr>
+          </a:lnRef>
+          <a:fillRef idx="1">
+            <a:schemeClr val="accent1"/>
+          </a:fillRef>
+          <a:effectRef idx="0">
+            <a:schemeClr val="accent1"/>
+          </a:effectRef>
+          <a:fontRef idx="minor"/>
+        </p:style>
+        <p:txBody>
+          <a:bodyPr lIns="56250" tIns="28125" rIns="56250" bIns="28125" anchor="ctr">
+            <a:noAutofit/>
+          </a:bodyPr>
+          <a:lstStyle/>
+          <a:p>
+            <a:pPr algn="ctr"/>
+            <a:r>
+              <a:rPr lang="en-US" sz="800" spc="-1" dirty="0">
+                <a:solidFill>
+                  <a:srgbClr val="000000"/>
+                </a:solidFill>
+              </a:rPr>
+              <a:t>ENET ICSSG </a:t>
+            </a:r>
+            <a:r>
+              <a:rPr lang="en-US" sz="800" spc="-1" dirty="0" err="1">
+                <a:solidFill>
+                  <a:srgbClr val="000000"/>
+                </a:solidFill>
+              </a:rPr>
+              <a:t>TCPServer</a:t>
+            </a:r>
+            <a:endParaRPr lang="en-IN" sz="800" spc="-1" dirty="0">
+              <a:solidFill>
+                <a:srgbClr val="000000"/>
+              </a:solidFill>
+              <a:latin typeface="Arial"/>
+            </a:endParaRPr>
+          </a:p>
+        </p:txBody>
+      </p:sp>
+      <p:sp>
+        <p:nvSpPr>
+          <p:cNvPr id="62" name="CustomShape 24">
+            <a:extLst>
+              <a:ext uri="{FF2B5EF4-FFF2-40B4-BE49-F238E27FC236}">
+                <a16:creationId xmlns:a16="http://schemas.microsoft.com/office/drawing/2014/main" id="{10C5E4D1-B6D1-4144-8C18-D95B1E9677E2}"/>
+              </a:ext>
+            </a:extLst>
+          </p:cNvPr>
+          <p:cNvSpPr/>
+          <p:nvPr/>
+        </p:nvSpPr>
+        <p:spPr>
+          <a:xfrm>
+            <a:off x="5342632" y="1177287"/>
+            <a:ext cx="744104" cy="281025"/>
+          </a:xfrm>
+          <a:prstGeom prst="rect">
+            <a:avLst/>
+          </a:prstGeom>
+          <a:solidFill>
+            <a:srgbClr val="92D050"/>
+          </a:solidFill>
+          <a:ln>
+            <a:noFill/>
+          </a:ln>
+          <a:effectLst>
+            <a:outerShdw blurRad="50760" dist="37674" dir="2700000" algn="tl" rotWithShape="0">
+              <a:srgbClr val="000000">
+                <a:alpha val="40000"/>
+              </a:srgbClr>
+            </a:outerShdw>
+          </a:effectLst>
+        </p:spPr>
+        <p:style>
+          <a:lnRef idx="2">
+            <a:schemeClr val="accent1">
+              <a:shade val="50000"/>
+            </a:schemeClr>
+          </a:lnRef>
+          <a:fillRef idx="1">
+            <a:schemeClr val="accent1"/>
+          </a:fillRef>
+          <a:effectRef idx="0">
+            <a:schemeClr val="accent1"/>
+          </a:effectRef>
+          <a:fontRef idx="minor"/>
+        </p:style>
+        <p:txBody>
+          <a:bodyPr lIns="56250" tIns="28125" rIns="56250" bIns="28125" anchor="ctr">
+            <a:noAutofit/>
+          </a:bodyPr>
+          <a:lstStyle/>
+          <a:p>
+            <a:pPr algn="ctr"/>
+            <a:r>
+              <a:rPr lang="en-IN" sz="800" spc="-1" dirty="0">
+                <a:solidFill>
+                  <a:srgbClr val="000000"/>
+                </a:solidFill>
+                <a:latin typeface="Arial"/>
+              </a:rPr>
+              <a:t>ENET LWIP ICSSG</a:t>
+            </a:r>
+          </a:p>
+        </p:txBody>
+      </p:sp>
+      <p:sp>
+        <p:nvSpPr>
+          <p:cNvPr id="59" name="CustomShape 15">
+            <a:extLst>
+              <a:ext uri="{FF2B5EF4-FFF2-40B4-BE49-F238E27FC236}">
+                <a16:creationId xmlns:a16="http://schemas.microsoft.com/office/drawing/2014/main" id="{27C412CF-A645-442A-A325-31275374C607}"/>
+              </a:ext>
+            </a:extLst>
+          </p:cNvPr>
+          <p:cNvSpPr/>
+          <p:nvPr/>
+        </p:nvSpPr>
+        <p:spPr>
+          <a:xfrm>
+            <a:off x="2628525" y="2479540"/>
+            <a:ext cx="498200" cy="313537"/>
           </a:xfrm>
           <a:prstGeom prst="rect">
             <a:avLst/>
@@ -7119,13 +7405,22 @@
           <a:p>
             <a:pPr algn="ctr"/>
             <a:r>
+              <a:rPr lang="en-US" sz="800" spc="-1" dirty="0" err="1">
+                <a:solidFill>
+                  <a:srgbClr val="FFFFFF"/>
+                </a:solidFill>
+                <a:latin typeface="Arial"/>
+              </a:rPr>
+              <a:t>Enet</a:t>
+            </a:r>
+            <a:r>
               <a:rPr lang="en-US" sz="800" spc="-1" dirty="0">
                 <a:solidFill>
                   <a:srgbClr val="FFFFFF"/>
                 </a:solidFill>
                 <a:latin typeface="Arial"/>
               </a:rPr>
-              <a:t>ICSS EMAC</a:t>
+              <a:t> LLD</a:t>
             </a:r>
             <a:endParaRPr lang="en-IN" sz="800" spc="-1" dirty="0">
               <a:solidFill>
@@ -7133,225 +7428,6 @@
               </a:solidFill>
               <a:latin typeface="Arial"/>
             </a:endParaRPr>
-          </a:p>
-        </p:txBody>
-      </p:sp>
-      <p:sp>
-        <p:nvSpPr>
-          <p:cNvPr id="60" name="CustomShape 8">
-            <a:extLst>
-              <a:ext uri="{FF2B5EF4-FFF2-40B4-BE49-F238E27FC236}">
-                <a16:creationId xmlns:a16="http://schemas.microsoft.com/office/drawing/2014/main" id="{AFCA26DE-C2C0-4726-B3B8-382C307C9245}"/>
-              </a:ext>
-            </a:extLst>
-          </p:cNvPr>
-          <p:cNvSpPr/>
-          <p:nvPr/>
-        </p:nvSpPr>
-        <p:spPr>
-          <a:xfrm>
-            <a:off x="2258652" y="988313"/>
-            <a:ext cx="501076" cy="281025"/>
-          </a:xfrm>
-          <a:prstGeom prst="rect">
-            <a:avLst/>
-          </a:prstGeom>
-          <a:solidFill>
-            <a:srgbClr val="92D050"/>
-          </a:solidFill>
-          <a:ln>
-            <a:noFill/>
-          </a:ln>
-          <a:effectLst>
-            <a:outerShdw blurRad="50760" dist="37674" dir="2700000" algn="tl" rotWithShape="0">
-              <a:srgbClr val="000000">
-                <a:alpha val="40000"/>
-              </a:srgbClr>
-            </a:outerShdw>
-          </a:effectLst>
-        </p:spPr>
-        <p:style>
-          <a:lnRef idx="2">
-            <a:schemeClr val="accent1">
-              <a:shade val="50000"/>
-            </a:schemeClr>
-          </a:lnRef>
-          <a:fillRef idx="1">
-            <a:schemeClr val="accent1"/>
-          </a:fillRef>
-          <a:effectRef idx="0">
-            <a:schemeClr val="accent1"/>
-          </a:effectRef>
-          <a:fontRef idx="minor"/>
-        </p:style>
-        <p:txBody>
-          <a:bodyPr lIns="56250" tIns="28125" rIns="56250" bIns="28125" anchor="ctr">
-            <a:noAutofit/>
-          </a:bodyPr>
-          <a:lstStyle/>
-          <a:p>
-            <a:pPr algn="ctr"/>
-            <a:r>
-              <a:rPr lang="en-US" sz="800" spc="-1" dirty="0">
-                <a:solidFill>
-                  <a:srgbClr val="000000"/>
-                </a:solidFill>
-              </a:rPr>
-              <a:t>IOLINK</a:t>
-            </a:r>
-            <a:endParaRPr lang="en-IN" sz="800" spc="-1" dirty="0">
-              <a:solidFill>
-                <a:srgbClr val="000000"/>
-              </a:solidFill>
-              <a:latin typeface="Arial"/>
-            </a:endParaRPr>
-          </a:p>
-        </p:txBody>
-      </p:sp>
-      <p:sp>
-        <p:nvSpPr>
-          <p:cNvPr id="61" name="CustomShape 8">
-            <a:extLst>
-              <a:ext uri="{FF2B5EF4-FFF2-40B4-BE49-F238E27FC236}">
-                <a16:creationId xmlns:a16="http://schemas.microsoft.com/office/drawing/2014/main" id="{BD18885D-0591-4655-9751-9A6EE4B0C3ED}"/>
-              </a:ext>
-            </a:extLst>
-          </p:cNvPr>
-          <p:cNvSpPr/>
-          <p:nvPr/>
-        </p:nvSpPr>
-        <p:spPr>
-          <a:xfrm>
-            <a:off x="5346752" y="824037"/>
-            <a:ext cx="739983" cy="281025"/>
-          </a:xfrm>
-          <a:prstGeom prst="rect">
-            <a:avLst/>
-          </a:prstGeom>
-          <a:solidFill>
-            <a:srgbClr val="92D050"/>
-          </a:solidFill>
-          <a:ln>
-            <a:noFill/>
-          </a:ln>
-          <a:effectLst>
-            <a:outerShdw blurRad="50760" dist="37674" dir="2700000" algn="tl" rotWithShape="0">
-              <a:srgbClr val="000000">
-                <a:alpha val="40000"/>
-              </a:srgbClr>
-            </a:outerShdw>
-          </a:effectLst>
-        </p:spPr>
-        <p:style>
-          <a:lnRef idx="2">
-            <a:schemeClr val="accent1">
-              <a:shade val="50000"/>
-            </a:schemeClr>
-          </a:lnRef>
-          <a:fillRef idx="1">
-            <a:schemeClr val="accent1"/>
-          </a:fillRef>
-          <a:effectRef idx="0">
-            <a:schemeClr val="accent1"/>
-          </a:effectRef>
-          <a:fontRef idx="minor"/>
-        </p:style>
-        <p:txBody>
-          <a:bodyPr lIns="56250" tIns="28125" rIns="56250" bIns="28125" anchor="ctr">
-            <a:noAutofit/>
-          </a:bodyPr>
-          <a:lstStyle/>
-          <a:p>
-            <a:pPr algn="ctr"/>
-            <a:r>
-              <a:rPr lang="en-US" sz="800" spc="-1" dirty="0">
-                <a:solidFill>
-                  <a:srgbClr val="000000"/>
-                </a:solidFill>
-              </a:rPr>
-              <a:t>ENET ICSSG </a:t>
-            </a:r>
-            <a:r>
-              <a:rPr lang="en-US" sz="800" spc="-1" dirty="0" err="1">
-                <a:solidFill>
-                  <a:srgbClr val="000000"/>
-                </a:solidFill>
-              </a:rPr>
-              <a:t>TCPServer</a:t>
-            </a:r>
-            <a:endParaRPr lang="en-IN" sz="800" spc="-1" dirty="0">
-              <a:solidFill>
-                <a:srgbClr val="000000"/>
-              </a:solidFill>
-              <a:latin typeface="Arial"/>
-            </a:endParaRPr>
-          </a:p>
-        </p:txBody>
-      </p:sp>
-      <p:sp>
-        <p:nvSpPr>
-          <p:cNvPr id="62" name="CustomShape 24">
-            <a:extLst>
-              <a:ext uri="{FF2B5EF4-FFF2-40B4-BE49-F238E27FC236}">
-                <a16:creationId xmlns:a16="http://schemas.microsoft.com/office/drawing/2014/main" id="{10C5E4D1-B6D1-4144-8C18-D95B1E9677E2}"/>
-              </a:ext>
-            </a:extLst>
-          </p:cNvPr>
-          <p:cNvSpPr/>
-          <p:nvPr/>
-        </p:nvSpPr>
-        <p:spPr>
-          <a:xfrm>
-            <a:off x="5342632" y="1177287"/>
-            <a:ext cx="744104" cy="281025"/>
-          </a:xfrm>
-          <a:prstGeom prst="rect">
-            <a:avLst/>
-          </a:prstGeom>
-          <a:solidFill>
-            <a:srgbClr val="92D050"/>
-          </a:solidFill>
-          <a:ln>
-            <a:noFill/>
-          </a:ln>
-          <a:effectLst>
-            <a:outerShdw blurRad="50760" dist="37674" dir="2700000" algn="tl" rotWithShape="0">
-              <a:srgbClr val="000000">
-                <a:alpha val="40000"/>
-              </a:srgbClr>
-            </a:outerShdw>
-          </a:effectLst>
-        </p:spPr>
-        <p:style>
-          <a:lnRef idx="2">
-            <a:schemeClr val="accent1">
-              <a:shade val="50000"/>
-            </a:schemeClr>
-          </a:lnRef>
-          <a:fillRef idx="1">
-            <a:schemeClr val="accent1"/>
-          </a:fillRef>
-          <a:effectRef idx="0">
-            <a:schemeClr val="accent1"/>
-          </a:effectRef>
-          <a:fontRef idx="minor"/>
-        </p:style>
-        <p:txBody>
-          <a:bodyPr lIns="56250" tIns="28125" rIns="56250" bIns="28125" anchor="ctr">
-            <a:noAutofit/>
-          </a:bodyPr>
-          <a:lstStyle/>
-          <a:p>
-            <a:pPr algn="ctr"/>
-            <a:r>
-              <a:rPr lang="en-IN" sz="800" spc="-1" dirty="0">
-                <a:solidFill>
-                  <a:srgbClr val="000000"/>
-                </a:solidFill>
-                <a:latin typeface="Arial"/>
-              </a:rPr>
-              <a:t>ENET LWIP ICSSG</a:t>
-            </a:r>
           </a:p>
         </p:txBody>
       </p:sp>
@@ -9508,7 +9584,7 @@
             <a:avLst/>
           </a:prstGeom>
           <a:solidFill>
-            <a:schemeClr val="bg2"/>
+            <a:srgbClr val="92D050"/>
           </a:solidFill>
           <a:ln>
             <a:noFill/>
@@ -9544,17 +9620,26 @@
             <a:pPr algn="ctr"/>
             <a:r>
               <a:rPr lang="en-US" sz="800" spc="-1" dirty="0">
+                <a:latin typeface="Arial"/>
+              </a:rPr>
+              <a:t>ICSS</a:t>
+            </a:r>
+            <a:r>
+              <a:rPr lang="en-US" sz="800" spc="-1" dirty="0">
                 <a:solidFill>
                   <a:srgbClr val="FFFFFF"/>
                 </a:solidFill>
                 <a:latin typeface="Arial"/>
               </a:rPr>
-              <a:t>ICSS EMAC</a:t>
+              <a:t> </a:t>
+            </a:r>
+            <a:r>
+              <a:rPr lang="en-US" sz="800" spc="-1" dirty="0">
+                <a:latin typeface="Arial"/>
+              </a:rPr>
+              <a:t>EMAC</a:t>
             </a:r>
             <a:endParaRPr lang="en-IN" sz="800" spc="-1" dirty="0">
-              <a:solidFill>
-                <a:srgbClr val="FFFFFF"/>
-              </a:solidFill>
               <a:latin typeface="Arial"/>
             </a:endParaRPr>
           </a:p>

</xml_diff>

<commit_message>
am64x/am243x/am263x : docs : update the docs for v9.1 release
Update the documentation for v9.1 release

Fixes: PINDSW-7153

Signed-off-by: Naresh A <nareshk@ti.com>
</commit_message>
<xml_diff>
--- a/docs_src/docs/api_guide/images/images.pptx
+++ b/docs_src/docs/api_guide/images/images.pptx
@@ -5,11 +5,12 @@
     <p:sldMasterId id="2147483648" r:id="rId1"/>
   </p:sldMasterIdLst>
   <p:notesMasterIdLst>
-    <p:notesMasterId r:id="rId4"/>
+    <p:notesMasterId r:id="rId5"/>
   </p:notesMasterIdLst>
   <p:sldIdLst>
     <p:sldId id="284" r:id="rId2"/>
     <p:sldId id="285" r:id="rId3"/>
+    <p:sldId id="286" r:id="rId4"/>
   </p:sldIdLst>
   <p:sldSz cx="9144000" cy="5143500" type="screen16x9"/>
   <p:notesSz cx="9296400" cy="14770100"/>
@@ -253,7 +254,7 @@
           <a:p>
             <a:fld id="{4ADF24D4-082E-4F97-B9C4-E0764843ED08}" type="datetimeFigureOut">
               <a:rPr lang="en-US" smtClean="0"/>
-              <a:t>9/8/2023</a:t>
+              <a:t>12/28/2023</a:t>
             </a:fld>
             <a:endParaRPr lang="en-US"/>
           </a:p>
@@ -9649,6 +9650,3440 @@
     <p:extLst>
       <p:ext uri="{BB962C8B-B14F-4D97-AF65-F5344CB8AC3E}">
         <p14:creationId xmlns:p14="http://schemas.microsoft.com/office/powerpoint/2010/main" val="409979454"/>
+      </p:ext>
+    </p:extLst>
+  </p:cSld>
+  <p:clrMapOvr>
+    <a:masterClrMapping/>
+  </p:clrMapOvr>
+</p:sld>
+</file>
+
+<file path=ppt/slides/slide3.xml><?xml version="1.0" encoding="utf-8"?>
+<p:sld xmlns:a="http://schemas.openxmlformats.org/drawingml/2006/main" xmlns:r="http://schemas.openxmlformats.org/officeDocument/2006/relationships" xmlns:p="http://schemas.openxmlformats.org/presentationml/2006/main">
+  <p:cSld>
+    <p:spTree>
+      <p:nvGrpSpPr>
+        <p:cNvPr id="1" name=""/>
+        <p:cNvGrpSpPr/>
+        <p:nvPr/>
+      </p:nvGrpSpPr>
+      <p:grpSpPr>
+        <a:xfrm>
+          <a:off x="0" y="0"/>
+          <a:ext cx="0" cy="0"/>
+          <a:chOff x="0" y="0"/>
+          <a:chExt cx="0" cy="0"/>
+        </a:xfrm>
+      </p:grpSpPr>
+      <p:sp>
+        <p:nvSpPr>
+          <p:cNvPr id="2" name="Title 1">
+            <a:extLst>
+              <a:ext uri="{FF2B5EF4-FFF2-40B4-BE49-F238E27FC236}">
+                <a16:creationId xmlns:a16="http://schemas.microsoft.com/office/drawing/2014/main" id="{2725729B-986F-4361-8441-2202045AB807}"/>
+              </a:ext>
+            </a:extLst>
+          </p:cNvPr>
+          <p:cNvSpPr>
+            <a:spLocks noGrp="1"/>
+          </p:cNvSpPr>
+          <p:nvPr>
+            <p:ph type="title"/>
+          </p:nvPr>
+        </p:nvSpPr>
+        <p:spPr>
+          <a:xfrm>
+            <a:off x="231775" y="107163"/>
+            <a:ext cx="8458200" cy="610791"/>
+          </a:xfrm>
+        </p:spPr>
+        <p:txBody>
+          <a:bodyPr/>
+          <a:lstStyle/>
+          <a:p>
+            <a:r>
+              <a:rPr lang="en-US" sz="2400" dirty="0"/>
+              <a:t>Industrial Communications SDK </a:t>
+            </a:r>
+            <a:r>
+              <a:rPr lang="en-US" sz="2400" dirty="0">
+                <a:solidFill>
+                  <a:schemeClr val="tx1"/>
+                </a:solidFill>
+              </a:rPr>
+              <a:t>| Component Mapping</a:t>
+            </a:r>
+          </a:p>
+        </p:txBody>
+      </p:sp>
+      <p:sp>
+        <p:nvSpPr>
+          <p:cNvPr id="93" name="CustomShape 1">
+            <a:extLst>
+              <a:ext uri="{FF2B5EF4-FFF2-40B4-BE49-F238E27FC236}">
+                <a16:creationId xmlns:a16="http://schemas.microsoft.com/office/drawing/2014/main" id="{F2BD7EF1-9939-4343-B882-9BB7D2B6DE8E}"/>
+              </a:ext>
+            </a:extLst>
+          </p:cNvPr>
+          <p:cNvSpPr/>
+          <p:nvPr/>
+        </p:nvSpPr>
+        <p:spPr>
+          <a:xfrm>
+            <a:off x="585455" y="2976642"/>
+            <a:ext cx="5564342" cy="666000"/>
+          </a:xfrm>
+          <a:prstGeom prst="rect">
+            <a:avLst/>
+          </a:prstGeom>
+          <a:noFill/>
+          <a:ln>
+            <a:solidFill>
+              <a:srgbClr val="000000"/>
+            </a:solidFill>
+            <a:round/>
+          </a:ln>
+        </p:spPr>
+        <p:style>
+          <a:lnRef idx="2">
+            <a:schemeClr val="accent1">
+              <a:shade val="50000"/>
+            </a:schemeClr>
+          </a:lnRef>
+          <a:fillRef idx="1">
+            <a:schemeClr val="accent1"/>
+          </a:fillRef>
+          <a:effectRef idx="0">
+            <a:schemeClr val="accent1"/>
+          </a:effectRef>
+          <a:fontRef idx="minor"/>
+        </p:style>
+        <p:txBody>
+          <a:bodyPr lIns="56250" tIns="28125" rIns="56250" bIns="28125" anchor="ctr">
+            <a:noAutofit/>
+          </a:bodyPr>
+          <a:lstStyle/>
+          <a:p>
+            <a:pPr>
+              <a:lnSpc>
+                <a:spcPct val="100000"/>
+              </a:lnSpc>
+              <a:buNone/>
+            </a:pPr>
+            <a:r>
+              <a:rPr lang="en-US" sz="1125" spc="-1" dirty="0">
+                <a:solidFill>
+                  <a:srgbClr val="000000"/>
+                </a:solidFill>
+                <a:latin typeface="Arial"/>
+                <a:ea typeface="DejaVu Sans"/>
+              </a:rPr>
+              <a:t>OS Kernel</a:t>
+            </a:r>
+            <a:endParaRPr lang="en-IN" sz="1125" spc="-1" dirty="0">
+              <a:latin typeface="Arial"/>
+            </a:endParaRPr>
+          </a:p>
+        </p:txBody>
+      </p:sp>
+      <p:sp>
+        <p:nvSpPr>
+          <p:cNvPr id="94" name="CustomShape 3">
+            <a:extLst>
+              <a:ext uri="{FF2B5EF4-FFF2-40B4-BE49-F238E27FC236}">
+                <a16:creationId xmlns:a16="http://schemas.microsoft.com/office/drawing/2014/main" id="{F396EB7B-63A1-4BA5-B2F2-757577BDD2A9}"/>
+              </a:ext>
+            </a:extLst>
+          </p:cNvPr>
+          <p:cNvSpPr/>
+          <p:nvPr/>
+        </p:nvSpPr>
+        <p:spPr>
+          <a:xfrm>
+            <a:off x="2694450" y="3024342"/>
+            <a:ext cx="3350358" cy="237375"/>
+          </a:xfrm>
+          <a:prstGeom prst="rect">
+            <a:avLst/>
+          </a:prstGeom>
+          <a:solidFill>
+            <a:schemeClr val="bg2"/>
+          </a:solidFill>
+          <a:ln>
+            <a:noFill/>
+          </a:ln>
+          <a:effectLst>
+            <a:outerShdw blurRad="50760" dist="37674" dir="2700000" algn="tl" rotWithShape="0">
+              <a:srgbClr val="000000">
+                <a:alpha val="40000"/>
+              </a:srgbClr>
+            </a:outerShdw>
+          </a:effectLst>
+        </p:spPr>
+        <p:style>
+          <a:lnRef idx="2">
+            <a:schemeClr val="accent1">
+              <a:shade val="50000"/>
+            </a:schemeClr>
+          </a:lnRef>
+          <a:fillRef idx="1">
+            <a:schemeClr val="accent1"/>
+          </a:fillRef>
+          <a:effectRef idx="0">
+            <a:schemeClr val="accent1"/>
+          </a:effectRef>
+          <a:fontRef idx="minor"/>
+        </p:style>
+        <p:txBody>
+          <a:bodyPr lIns="56250" tIns="28125" rIns="56250" bIns="28125" anchor="ctr">
+            <a:noAutofit/>
+          </a:bodyPr>
+          <a:lstStyle/>
+          <a:p>
+            <a:pPr algn="ctr">
+              <a:lnSpc>
+                <a:spcPct val="100000"/>
+              </a:lnSpc>
+              <a:buNone/>
+            </a:pPr>
+            <a:r>
+              <a:rPr lang="en-US" sz="1000" spc="-1" dirty="0">
+                <a:solidFill>
+                  <a:srgbClr val="FFFFFF"/>
+                </a:solidFill>
+                <a:latin typeface="Arial"/>
+                <a:ea typeface="DejaVu Sans"/>
+              </a:rPr>
+              <a:t>Driver Porting Layer (DPL)</a:t>
+            </a:r>
+            <a:endParaRPr lang="en-IN" sz="1000" spc="-1" dirty="0">
+              <a:latin typeface="Arial"/>
+            </a:endParaRPr>
+          </a:p>
+        </p:txBody>
+      </p:sp>
+      <p:sp>
+        <p:nvSpPr>
+          <p:cNvPr id="95" name="CustomShape 4">
+            <a:extLst>
+              <a:ext uri="{FF2B5EF4-FFF2-40B4-BE49-F238E27FC236}">
+                <a16:creationId xmlns:a16="http://schemas.microsoft.com/office/drawing/2014/main" id="{EE1ED833-9B8E-42DE-862A-332B8BB6C59F}"/>
+              </a:ext>
+            </a:extLst>
+          </p:cNvPr>
+          <p:cNvSpPr/>
+          <p:nvPr/>
+        </p:nvSpPr>
+        <p:spPr>
+          <a:xfrm>
+            <a:off x="2013589" y="2490666"/>
+            <a:ext cx="587485" cy="314308"/>
+          </a:xfrm>
+          <a:prstGeom prst="rect">
+            <a:avLst/>
+          </a:prstGeom>
+          <a:solidFill>
+            <a:schemeClr val="bg2"/>
+          </a:solidFill>
+          <a:ln>
+            <a:noFill/>
+          </a:ln>
+          <a:effectLst>
+            <a:outerShdw blurRad="50760" dist="37674" dir="2700000" algn="tl" rotWithShape="0">
+              <a:srgbClr val="000000">
+                <a:alpha val="40000"/>
+              </a:srgbClr>
+            </a:outerShdw>
+          </a:effectLst>
+        </p:spPr>
+        <p:style>
+          <a:lnRef idx="2">
+            <a:schemeClr val="accent1">
+              <a:shade val="50000"/>
+            </a:schemeClr>
+          </a:lnRef>
+          <a:fillRef idx="1">
+            <a:schemeClr val="accent1"/>
+          </a:fillRef>
+          <a:effectRef idx="0">
+            <a:schemeClr val="accent1"/>
+          </a:effectRef>
+          <a:fontRef idx="minor"/>
+        </p:style>
+        <p:txBody>
+          <a:bodyPr lIns="56250" tIns="28125" rIns="56250" bIns="28125" anchor="ctr">
+            <a:noAutofit/>
+          </a:bodyPr>
+          <a:lstStyle/>
+          <a:p>
+            <a:pPr algn="ctr"/>
+            <a:r>
+              <a:rPr lang="en-US" sz="800" spc="-1" dirty="0">
+                <a:solidFill>
+                  <a:srgbClr val="FFFFFF"/>
+                </a:solidFill>
+                <a:latin typeface="Arial"/>
+              </a:rPr>
+              <a:t>SOC Peripheral</a:t>
+            </a:r>
+            <a:endParaRPr lang="en-IN" sz="800" spc="-1" dirty="0">
+              <a:solidFill>
+                <a:srgbClr val="FFFFFF"/>
+              </a:solidFill>
+              <a:latin typeface="Arial"/>
+            </a:endParaRPr>
+          </a:p>
+        </p:txBody>
+      </p:sp>
+      <p:sp>
+        <p:nvSpPr>
+          <p:cNvPr id="96" name="CustomShape 5">
+            <a:extLst>
+              <a:ext uri="{FF2B5EF4-FFF2-40B4-BE49-F238E27FC236}">
+                <a16:creationId xmlns:a16="http://schemas.microsoft.com/office/drawing/2014/main" id="{59C50511-9CD0-4024-89B9-50BB30830633}"/>
+              </a:ext>
+            </a:extLst>
+          </p:cNvPr>
+          <p:cNvSpPr/>
+          <p:nvPr/>
+        </p:nvSpPr>
+        <p:spPr>
+          <a:xfrm>
+            <a:off x="4358243" y="3310092"/>
+            <a:ext cx="1686565" cy="237375"/>
+          </a:xfrm>
+          <a:prstGeom prst="rect">
+            <a:avLst/>
+          </a:prstGeom>
+          <a:solidFill>
+            <a:schemeClr val="bg2"/>
+          </a:solidFill>
+          <a:ln>
+            <a:noFill/>
+          </a:ln>
+          <a:effectLst>
+            <a:outerShdw blurRad="50760" dist="37674" dir="2700000" algn="tl" rotWithShape="0">
+              <a:srgbClr val="000000">
+                <a:alpha val="40000"/>
+              </a:srgbClr>
+            </a:outerShdw>
+          </a:effectLst>
+        </p:spPr>
+        <p:style>
+          <a:lnRef idx="2">
+            <a:schemeClr val="accent1">
+              <a:shade val="50000"/>
+            </a:schemeClr>
+          </a:lnRef>
+          <a:fillRef idx="1">
+            <a:schemeClr val="accent1"/>
+          </a:fillRef>
+          <a:effectRef idx="0">
+            <a:schemeClr val="accent1"/>
+          </a:effectRef>
+          <a:fontRef idx="minor"/>
+        </p:style>
+        <p:txBody>
+          <a:bodyPr lIns="56250" tIns="28125" rIns="56250" bIns="28125" anchor="ctr">
+            <a:noAutofit/>
+          </a:bodyPr>
+          <a:lstStyle/>
+          <a:p>
+            <a:pPr algn="ctr">
+              <a:lnSpc>
+                <a:spcPct val="100000"/>
+              </a:lnSpc>
+              <a:buNone/>
+            </a:pPr>
+            <a:r>
+              <a:rPr lang="en-US" sz="1000" spc="-1" dirty="0">
+                <a:solidFill>
+                  <a:srgbClr val="FFFFFF"/>
+                </a:solidFill>
+                <a:latin typeface="Arial"/>
+                <a:ea typeface="DejaVu Sans"/>
+              </a:rPr>
+              <a:t>No RTOS</a:t>
+            </a:r>
+            <a:endParaRPr lang="en-IN" sz="1000" spc="-1" dirty="0">
+              <a:latin typeface="Arial"/>
+            </a:endParaRPr>
+          </a:p>
+        </p:txBody>
+      </p:sp>
+      <p:sp>
+        <p:nvSpPr>
+          <p:cNvPr id="97" name="CustomShape 6">
+            <a:extLst>
+              <a:ext uri="{FF2B5EF4-FFF2-40B4-BE49-F238E27FC236}">
+                <a16:creationId xmlns:a16="http://schemas.microsoft.com/office/drawing/2014/main" id="{4EC958E8-FC03-4C5C-9647-29B758349B13}"/>
+              </a:ext>
+            </a:extLst>
+          </p:cNvPr>
+          <p:cNvSpPr/>
+          <p:nvPr/>
+        </p:nvSpPr>
+        <p:spPr>
+          <a:xfrm>
+            <a:off x="2694449" y="3310092"/>
+            <a:ext cx="1570419" cy="237375"/>
+          </a:xfrm>
+          <a:prstGeom prst="rect">
+            <a:avLst/>
+          </a:prstGeom>
+          <a:solidFill>
+            <a:schemeClr val="bg2"/>
+          </a:solidFill>
+          <a:ln>
+            <a:noFill/>
+          </a:ln>
+          <a:effectLst>
+            <a:outerShdw blurRad="50760" dist="37674" dir="2700000" algn="tl" rotWithShape="0">
+              <a:srgbClr val="000000">
+                <a:alpha val="40000"/>
+              </a:srgbClr>
+            </a:outerShdw>
+          </a:effectLst>
+        </p:spPr>
+        <p:style>
+          <a:lnRef idx="2">
+            <a:schemeClr val="accent1">
+              <a:shade val="50000"/>
+            </a:schemeClr>
+          </a:lnRef>
+          <a:fillRef idx="1">
+            <a:schemeClr val="accent1"/>
+          </a:fillRef>
+          <a:effectRef idx="0">
+            <a:schemeClr val="accent1"/>
+          </a:effectRef>
+          <a:fontRef idx="minor"/>
+        </p:style>
+        <p:txBody>
+          <a:bodyPr lIns="56250" tIns="28125" rIns="56250" bIns="28125" anchor="ctr">
+            <a:noAutofit/>
+          </a:bodyPr>
+          <a:lstStyle/>
+          <a:p>
+            <a:pPr algn="ctr">
+              <a:lnSpc>
+                <a:spcPct val="100000"/>
+              </a:lnSpc>
+              <a:buNone/>
+            </a:pPr>
+            <a:r>
+              <a:rPr lang="en-US" sz="1000" spc="-1" dirty="0" err="1">
+                <a:solidFill>
+                  <a:srgbClr val="FFFFFF"/>
+                </a:solidFill>
+                <a:latin typeface="Arial"/>
+                <a:ea typeface="DejaVu Sans"/>
+              </a:rPr>
+              <a:t>FreeRTOS</a:t>
+            </a:r>
+            <a:r>
+              <a:rPr lang="en-US" sz="1000" spc="-1" dirty="0">
+                <a:solidFill>
+                  <a:srgbClr val="FFFFFF"/>
+                </a:solidFill>
+                <a:latin typeface="Arial"/>
+                <a:ea typeface="DejaVu Sans"/>
+              </a:rPr>
+              <a:t> Kernel</a:t>
+            </a:r>
+            <a:endParaRPr lang="en-IN" sz="1000" spc="-1" dirty="0">
+              <a:latin typeface="Arial"/>
+            </a:endParaRPr>
+          </a:p>
+        </p:txBody>
+      </p:sp>
+      <p:sp>
+        <p:nvSpPr>
+          <p:cNvPr id="98" name="CustomShape 7">
+            <a:extLst>
+              <a:ext uri="{FF2B5EF4-FFF2-40B4-BE49-F238E27FC236}">
+                <a16:creationId xmlns:a16="http://schemas.microsoft.com/office/drawing/2014/main" id="{BBDFF6FF-96DF-415E-B361-BF5DECAA8CF2}"/>
+              </a:ext>
+            </a:extLst>
+          </p:cNvPr>
+          <p:cNvSpPr/>
+          <p:nvPr/>
+        </p:nvSpPr>
+        <p:spPr>
+          <a:xfrm>
+            <a:off x="1444397" y="3024342"/>
+            <a:ext cx="1156677" cy="523125"/>
+          </a:xfrm>
+          <a:prstGeom prst="rect">
+            <a:avLst/>
+          </a:prstGeom>
+          <a:solidFill>
+            <a:schemeClr val="bg2"/>
+          </a:solidFill>
+          <a:ln>
+            <a:noFill/>
+          </a:ln>
+          <a:effectLst>
+            <a:outerShdw blurRad="50760" dist="37674" dir="2700000" algn="tl" rotWithShape="0">
+              <a:srgbClr val="000000">
+                <a:alpha val="40000"/>
+              </a:srgbClr>
+            </a:outerShdw>
+          </a:effectLst>
+        </p:spPr>
+        <p:style>
+          <a:lnRef idx="2">
+            <a:schemeClr val="accent1">
+              <a:shade val="50000"/>
+            </a:schemeClr>
+          </a:lnRef>
+          <a:fillRef idx="1">
+            <a:schemeClr val="accent1"/>
+          </a:fillRef>
+          <a:effectRef idx="0">
+            <a:schemeClr val="accent1"/>
+          </a:effectRef>
+          <a:fontRef idx="minor"/>
+        </p:style>
+        <p:txBody>
+          <a:bodyPr lIns="56250" tIns="28125" rIns="56250" bIns="28125" anchor="ctr">
+            <a:noAutofit/>
+          </a:bodyPr>
+          <a:lstStyle/>
+          <a:p>
+            <a:pPr algn="ctr">
+              <a:lnSpc>
+                <a:spcPct val="100000"/>
+              </a:lnSpc>
+              <a:buNone/>
+            </a:pPr>
+            <a:r>
+              <a:rPr lang="en-US" sz="1000" spc="-1" dirty="0" err="1">
+                <a:solidFill>
+                  <a:srgbClr val="FFFFFF"/>
+                </a:solidFill>
+                <a:latin typeface="Arial"/>
+                <a:ea typeface="DejaVu Sans"/>
+              </a:rPr>
+              <a:t>FreeRTOS</a:t>
+            </a:r>
+            <a:r>
+              <a:rPr lang="en-US" sz="1000" spc="-1" dirty="0">
+                <a:solidFill>
+                  <a:srgbClr val="FFFFFF"/>
+                </a:solidFill>
+                <a:latin typeface="Arial"/>
+                <a:ea typeface="DejaVu Sans"/>
+              </a:rPr>
+              <a:t> POSIX </a:t>
+            </a:r>
+            <a:endParaRPr lang="en-IN" sz="1000" spc="-1" dirty="0">
+              <a:latin typeface="Arial"/>
+            </a:endParaRPr>
+          </a:p>
+        </p:txBody>
+      </p:sp>
+      <p:sp>
+        <p:nvSpPr>
+          <p:cNvPr id="99" name="CustomShape 8">
+            <a:extLst>
+              <a:ext uri="{FF2B5EF4-FFF2-40B4-BE49-F238E27FC236}">
+                <a16:creationId xmlns:a16="http://schemas.microsoft.com/office/drawing/2014/main" id="{300ACF90-638E-45E4-AA50-B7E85398CF97}"/>
+              </a:ext>
+            </a:extLst>
+          </p:cNvPr>
+          <p:cNvSpPr/>
+          <p:nvPr/>
+        </p:nvSpPr>
+        <p:spPr>
+          <a:xfrm>
+            <a:off x="2877625" y="1139326"/>
+            <a:ext cx="677087" cy="281025"/>
+          </a:xfrm>
+          <a:prstGeom prst="rect">
+            <a:avLst/>
+          </a:prstGeom>
+          <a:solidFill>
+            <a:srgbClr val="92D050"/>
+          </a:solidFill>
+          <a:ln>
+            <a:noFill/>
+          </a:ln>
+          <a:effectLst>
+            <a:outerShdw blurRad="50760" dist="37674" dir="2700000" algn="tl" rotWithShape="0">
+              <a:srgbClr val="000000">
+                <a:alpha val="40000"/>
+              </a:srgbClr>
+            </a:outerShdw>
+          </a:effectLst>
+        </p:spPr>
+        <p:style>
+          <a:lnRef idx="2">
+            <a:schemeClr val="accent1">
+              <a:shade val="50000"/>
+            </a:schemeClr>
+          </a:lnRef>
+          <a:fillRef idx="1">
+            <a:schemeClr val="accent1"/>
+          </a:fillRef>
+          <a:effectRef idx="0">
+            <a:schemeClr val="accent1"/>
+          </a:effectRef>
+          <a:fontRef idx="minor"/>
+        </p:style>
+        <p:txBody>
+          <a:bodyPr lIns="56250" tIns="28125" rIns="56250" bIns="28125" anchor="ctr">
+            <a:noAutofit/>
+          </a:bodyPr>
+          <a:lstStyle/>
+          <a:p>
+            <a:pPr algn="ctr"/>
+            <a:r>
+              <a:rPr lang="en-US" sz="800" spc="-1" dirty="0" err="1">
+                <a:solidFill>
+                  <a:srgbClr val="000000"/>
+                </a:solidFill>
+              </a:rPr>
+              <a:t>EtherNet</a:t>
+            </a:r>
+            <a:r>
+              <a:rPr lang="en-US" sz="800" spc="-1">
+                <a:solidFill>
+                  <a:srgbClr val="000000"/>
+                </a:solidFill>
+              </a:rPr>
+              <a:t>/IP</a:t>
+            </a:r>
+            <a:endParaRPr lang="en-IN" sz="800" spc="-1" dirty="0">
+              <a:solidFill>
+                <a:srgbClr val="000000"/>
+              </a:solidFill>
+            </a:endParaRPr>
+          </a:p>
+        </p:txBody>
+      </p:sp>
+      <p:sp>
+        <p:nvSpPr>
+          <p:cNvPr id="102" name="CustomShape 12">
+            <a:extLst>
+              <a:ext uri="{FF2B5EF4-FFF2-40B4-BE49-F238E27FC236}">
+                <a16:creationId xmlns:a16="http://schemas.microsoft.com/office/drawing/2014/main" id="{F05CDA84-E504-4691-94C8-9C5429659CBF}"/>
+              </a:ext>
+            </a:extLst>
+          </p:cNvPr>
+          <p:cNvSpPr/>
+          <p:nvPr/>
+        </p:nvSpPr>
+        <p:spPr>
+          <a:xfrm>
+            <a:off x="585454" y="1641714"/>
+            <a:ext cx="5574783" cy="666000"/>
+          </a:xfrm>
+          <a:prstGeom prst="rect">
+            <a:avLst/>
+          </a:prstGeom>
+          <a:noFill/>
+          <a:ln>
+            <a:solidFill>
+              <a:srgbClr val="000000"/>
+            </a:solidFill>
+            <a:round/>
+          </a:ln>
+        </p:spPr>
+        <p:style>
+          <a:lnRef idx="2">
+            <a:schemeClr val="accent1">
+              <a:shade val="50000"/>
+            </a:schemeClr>
+          </a:lnRef>
+          <a:fillRef idx="1">
+            <a:schemeClr val="accent1"/>
+          </a:fillRef>
+          <a:effectRef idx="0">
+            <a:schemeClr val="accent1"/>
+          </a:effectRef>
+          <a:fontRef idx="minor"/>
+        </p:style>
+        <p:txBody>
+          <a:bodyPr lIns="56250" tIns="28125" rIns="56250" bIns="28125" anchor="ctr">
+            <a:noAutofit/>
+          </a:bodyPr>
+          <a:lstStyle/>
+          <a:p>
+            <a:pPr>
+              <a:lnSpc>
+                <a:spcPct val="100000"/>
+              </a:lnSpc>
+              <a:buNone/>
+            </a:pPr>
+            <a:r>
+              <a:rPr lang="en-US" sz="1125" spc="-1">
+                <a:solidFill>
+                  <a:srgbClr val="000000"/>
+                </a:solidFill>
+                <a:latin typeface="Arial"/>
+                <a:ea typeface="DejaVu Sans"/>
+              </a:rPr>
+              <a:t>Protocol stacks</a:t>
+            </a:r>
+            <a:endParaRPr lang="en-IN" sz="1125" spc="-1">
+              <a:latin typeface="Arial"/>
+            </a:endParaRPr>
+          </a:p>
+          <a:p>
+            <a:pPr>
+              <a:lnSpc>
+                <a:spcPct val="100000"/>
+              </a:lnSpc>
+              <a:buNone/>
+            </a:pPr>
+            <a:r>
+              <a:rPr lang="en-US" sz="1125" spc="-1">
+                <a:solidFill>
+                  <a:srgbClr val="000000"/>
+                </a:solidFill>
+                <a:latin typeface="Arial"/>
+                <a:ea typeface="DejaVu Sans"/>
+              </a:rPr>
+              <a:t>And Middleware</a:t>
+            </a:r>
+            <a:endParaRPr lang="en-IN" sz="1125" spc="-1">
+              <a:latin typeface="Arial"/>
+            </a:endParaRPr>
+          </a:p>
+        </p:txBody>
+      </p:sp>
+      <p:sp>
+        <p:nvSpPr>
+          <p:cNvPr id="103" name="CustomShape 14">
+            <a:extLst>
+              <a:ext uri="{FF2B5EF4-FFF2-40B4-BE49-F238E27FC236}">
+                <a16:creationId xmlns:a16="http://schemas.microsoft.com/office/drawing/2014/main" id="{FCF98F88-D895-4FB6-B9A3-2730BEF3D422}"/>
+              </a:ext>
+            </a:extLst>
+          </p:cNvPr>
+          <p:cNvSpPr/>
+          <p:nvPr/>
+        </p:nvSpPr>
+        <p:spPr>
+          <a:xfrm>
+            <a:off x="585455" y="2361492"/>
+            <a:ext cx="5574783" cy="542925"/>
+          </a:xfrm>
+          <a:prstGeom prst="rect">
+            <a:avLst/>
+          </a:prstGeom>
+          <a:noFill/>
+          <a:ln>
+            <a:solidFill>
+              <a:srgbClr val="000000"/>
+            </a:solidFill>
+            <a:round/>
+          </a:ln>
+        </p:spPr>
+        <p:style>
+          <a:lnRef idx="2">
+            <a:schemeClr val="accent1">
+              <a:shade val="50000"/>
+            </a:schemeClr>
+          </a:lnRef>
+          <a:fillRef idx="1">
+            <a:schemeClr val="accent1"/>
+          </a:fillRef>
+          <a:effectRef idx="0">
+            <a:schemeClr val="accent1"/>
+          </a:effectRef>
+          <a:fontRef idx="minor"/>
+        </p:style>
+        <p:txBody>
+          <a:bodyPr lIns="56250" tIns="28125" rIns="56250" bIns="28125" anchor="ctr">
+            <a:noAutofit/>
+          </a:bodyPr>
+          <a:lstStyle/>
+          <a:p>
+            <a:pPr>
+              <a:lnSpc>
+                <a:spcPct val="100000"/>
+              </a:lnSpc>
+              <a:buNone/>
+            </a:pPr>
+            <a:r>
+              <a:rPr lang="en-US" sz="1125" spc="-1">
+                <a:solidFill>
+                  <a:srgbClr val="000000"/>
+                </a:solidFill>
+                <a:latin typeface="Arial"/>
+                <a:ea typeface="DejaVu Sans"/>
+              </a:rPr>
+              <a:t>Drivers and</a:t>
+            </a:r>
+            <a:endParaRPr lang="en-IN" sz="1125" spc="-1">
+              <a:latin typeface="Arial"/>
+            </a:endParaRPr>
+          </a:p>
+          <a:p>
+            <a:pPr>
+              <a:lnSpc>
+                <a:spcPct val="100000"/>
+              </a:lnSpc>
+              <a:buNone/>
+            </a:pPr>
+            <a:r>
+              <a:rPr lang="en-US" sz="1125" spc="-1">
+                <a:solidFill>
+                  <a:srgbClr val="000000"/>
+                </a:solidFill>
+                <a:latin typeface="Arial"/>
+                <a:ea typeface="DejaVu Sans"/>
+              </a:rPr>
+              <a:t>HAL</a:t>
+            </a:r>
+            <a:endParaRPr lang="en-IN" sz="1125" spc="-1">
+              <a:latin typeface="Arial"/>
+            </a:endParaRPr>
+          </a:p>
+        </p:txBody>
+      </p:sp>
+      <p:sp>
+        <p:nvSpPr>
+          <p:cNvPr id="104" name="CustomShape 15">
+            <a:extLst>
+              <a:ext uri="{FF2B5EF4-FFF2-40B4-BE49-F238E27FC236}">
+                <a16:creationId xmlns:a16="http://schemas.microsoft.com/office/drawing/2014/main" id="{380BEEDE-BBC0-49D0-A027-E0BDA8EF854B}"/>
+              </a:ext>
+            </a:extLst>
+          </p:cNvPr>
+          <p:cNvSpPr/>
+          <p:nvPr/>
+        </p:nvSpPr>
+        <p:spPr>
+          <a:xfrm>
+            <a:off x="1397592" y="2481330"/>
+            <a:ext cx="587485" cy="313537"/>
+          </a:xfrm>
+          <a:prstGeom prst="rect">
+            <a:avLst/>
+          </a:prstGeom>
+          <a:solidFill>
+            <a:schemeClr val="bg2"/>
+          </a:solidFill>
+          <a:ln>
+            <a:noFill/>
+          </a:ln>
+          <a:effectLst>
+            <a:outerShdw blurRad="50760" dist="37674" dir="2700000" algn="tl" rotWithShape="0">
+              <a:srgbClr val="000000">
+                <a:alpha val="40000"/>
+              </a:srgbClr>
+            </a:outerShdw>
+          </a:effectLst>
+        </p:spPr>
+        <p:style>
+          <a:lnRef idx="2">
+            <a:schemeClr val="accent1">
+              <a:shade val="50000"/>
+            </a:schemeClr>
+          </a:lnRef>
+          <a:fillRef idx="1">
+            <a:schemeClr val="accent1"/>
+          </a:fillRef>
+          <a:effectRef idx="0">
+            <a:schemeClr val="accent1"/>
+          </a:effectRef>
+          <a:fontRef idx="minor"/>
+        </p:style>
+        <p:txBody>
+          <a:bodyPr lIns="56250" tIns="28125" rIns="56250" bIns="28125" anchor="ctr">
+            <a:noAutofit/>
+          </a:bodyPr>
+          <a:lstStyle/>
+          <a:p>
+            <a:pPr algn="ctr"/>
+            <a:r>
+              <a:rPr lang="en-US" sz="800" spc="-1" dirty="0">
+                <a:solidFill>
+                  <a:srgbClr val="FFFFFF"/>
+                </a:solidFill>
+                <a:latin typeface="Arial"/>
+              </a:rPr>
+              <a:t>Board Peripheral</a:t>
+            </a:r>
+            <a:endParaRPr lang="en-IN" sz="800" spc="-1" dirty="0">
+              <a:solidFill>
+                <a:srgbClr val="FFFFFF"/>
+              </a:solidFill>
+              <a:latin typeface="Arial"/>
+            </a:endParaRPr>
+          </a:p>
+        </p:txBody>
+      </p:sp>
+      <p:sp>
+        <p:nvSpPr>
+          <p:cNvPr id="105" name="CustomShape 16">
+            <a:extLst>
+              <a:ext uri="{FF2B5EF4-FFF2-40B4-BE49-F238E27FC236}">
+                <a16:creationId xmlns:a16="http://schemas.microsoft.com/office/drawing/2014/main" id="{4F3D06DA-9050-4F82-9322-CFBBA934B192}"/>
+              </a:ext>
+            </a:extLst>
+          </p:cNvPr>
+          <p:cNvSpPr/>
+          <p:nvPr/>
+        </p:nvSpPr>
+        <p:spPr>
+          <a:xfrm>
+            <a:off x="585455" y="964408"/>
+            <a:ext cx="5574783" cy="612932"/>
+          </a:xfrm>
+          <a:prstGeom prst="rect">
+            <a:avLst/>
+          </a:prstGeom>
+          <a:noFill/>
+          <a:ln>
+            <a:solidFill>
+              <a:srgbClr val="000000"/>
+            </a:solidFill>
+            <a:round/>
+          </a:ln>
+        </p:spPr>
+        <p:style>
+          <a:lnRef idx="2">
+            <a:schemeClr val="accent1">
+              <a:shade val="50000"/>
+            </a:schemeClr>
+          </a:lnRef>
+          <a:fillRef idx="1">
+            <a:schemeClr val="accent1"/>
+          </a:fillRef>
+          <a:effectRef idx="0">
+            <a:schemeClr val="accent1"/>
+          </a:effectRef>
+          <a:fontRef idx="minor"/>
+        </p:style>
+        <p:txBody>
+          <a:bodyPr lIns="56250" tIns="28125" rIns="56250" bIns="28125" anchor="ctr">
+            <a:noAutofit/>
+          </a:bodyPr>
+          <a:lstStyle/>
+          <a:p>
+            <a:pPr>
+              <a:lnSpc>
+                <a:spcPct val="100000"/>
+              </a:lnSpc>
+              <a:buNone/>
+            </a:pPr>
+            <a:r>
+              <a:rPr lang="en-US" sz="1125" spc="-1" dirty="0">
+                <a:solidFill>
+                  <a:srgbClr val="000000"/>
+                </a:solidFill>
+                <a:latin typeface="Arial"/>
+                <a:ea typeface="DejaVu Sans"/>
+              </a:rPr>
+              <a:t>Examples</a:t>
+            </a:r>
+            <a:endParaRPr lang="en-IN" sz="1125" spc="-1" dirty="0">
+              <a:latin typeface="Arial"/>
+            </a:endParaRPr>
+          </a:p>
+          <a:p>
+            <a:pPr>
+              <a:lnSpc>
+                <a:spcPct val="100000"/>
+              </a:lnSpc>
+              <a:buNone/>
+            </a:pPr>
+            <a:r>
+              <a:rPr lang="en-US" sz="1125" spc="-1" dirty="0">
+                <a:solidFill>
+                  <a:srgbClr val="000000"/>
+                </a:solidFill>
+                <a:latin typeface="Arial"/>
+                <a:ea typeface="DejaVu Sans"/>
+              </a:rPr>
+              <a:t>And Demos</a:t>
+            </a:r>
+            <a:endParaRPr lang="en-IN" sz="1125" spc="-1" dirty="0">
+              <a:latin typeface="Arial"/>
+            </a:endParaRPr>
+          </a:p>
+        </p:txBody>
+      </p:sp>
+      <p:sp>
+        <p:nvSpPr>
+          <p:cNvPr id="106" name="CustomShape 17">
+            <a:extLst>
+              <a:ext uri="{FF2B5EF4-FFF2-40B4-BE49-F238E27FC236}">
+                <a16:creationId xmlns:a16="http://schemas.microsoft.com/office/drawing/2014/main" id="{A732682E-0FAC-4756-92C6-C873E4A1FBF8}"/>
+              </a:ext>
+            </a:extLst>
+          </p:cNvPr>
+          <p:cNvSpPr/>
+          <p:nvPr/>
+        </p:nvSpPr>
+        <p:spPr>
+          <a:xfrm>
+            <a:off x="7214294" y="964406"/>
+            <a:ext cx="1197900" cy="2678235"/>
+          </a:xfrm>
+          <a:prstGeom prst="rect">
+            <a:avLst/>
+          </a:prstGeom>
+          <a:noFill/>
+          <a:ln>
+            <a:solidFill>
+              <a:srgbClr val="000000"/>
+            </a:solidFill>
+            <a:round/>
+          </a:ln>
+        </p:spPr>
+        <p:style>
+          <a:lnRef idx="2">
+            <a:schemeClr val="accent1">
+              <a:shade val="50000"/>
+            </a:schemeClr>
+          </a:lnRef>
+          <a:fillRef idx="1">
+            <a:schemeClr val="accent1"/>
+          </a:fillRef>
+          <a:effectRef idx="0">
+            <a:schemeClr val="accent1"/>
+          </a:effectRef>
+          <a:fontRef idx="minor"/>
+        </p:style>
+        <p:txBody>
+          <a:bodyPr lIns="56250" tIns="28125" rIns="56250" bIns="28125" anchor="t">
+            <a:noAutofit/>
+          </a:bodyPr>
+          <a:lstStyle/>
+          <a:p>
+            <a:pPr algn="ctr">
+              <a:lnSpc>
+                <a:spcPct val="100000"/>
+              </a:lnSpc>
+              <a:buNone/>
+            </a:pPr>
+            <a:r>
+              <a:rPr lang="en-US" sz="1125" spc="-1" dirty="0">
+                <a:solidFill>
+                  <a:srgbClr val="000000"/>
+                </a:solidFill>
+                <a:latin typeface="Arial"/>
+                <a:ea typeface="DejaVu Sans"/>
+              </a:rPr>
+              <a:t>Tools</a:t>
+            </a:r>
+            <a:endParaRPr lang="en-IN" sz="1125" spc="-1" dirty="0">
+              <a:latin typeface="Arial"/>
+            </a:endParaRPr>
+          </a:p>
+        </p:txBody>
+      </p:sp>
+      <p:sp>
+        <p:nvSpPr>
+          <p:cNvPr id="107" name="CustomShape 18">
+            <a:extLst>
+              <a:ext uri="{FF2B5EF4-FFF2-40B4-BE49-F238E27FC236}">
+                <a16:creationId xmlns:a16="http://schemas.microsoft.com/office/drawing/2014/main" id="{18303473-FA0C-4E6A-A716-8B344B585B1F}"/>
+              </a:ext>
+            </a:extLst>
+          </p:cNvPr>
+          <p:cNvSpPr/>
+          <p:nvPr/>
+        </p:nvSpPr>
+        <p:spPr>
+          <a:xfrm>
+            <a:off x="7307669" y="2285838"/>
+            <a:ext cx="1001475" cy="289125"/>
+          </a:xfrm>
+          <a:prstGeom prst="rect">
+            <a:avLst/>
+          </a:prstGeom>
+          <a:solidFill>
+            <a:schemeClr val="bg2"/>
+          </a:solidFill>
+          <a:ln>
+            <a:noFill/>
+          </a:ln>
+          <a:effectLst>
+            <a:outerShdw blurRad="50760" dist="37674" dir="2700000" algn="tl" rotWithShape="0">
+              <a:srgbClr val="000000">
+                <a:alpha val="40000"/>
+              </a:srgbClr>
+            </a:outerShdw>
+          </a:effectLst>
+        </p:spPr>
+        <p:style>
+          <a:lnRef idx="2">
+            <a:schemeClr val="accent1">
+              <a:shade val="50000"/>
+            </a:schemeClr>
+          </a:lnRef>
+          <a:fillRef idx="1">
+            <a:schemeClr val="accent1"/>
+          </a:fillRef>
+          <a:effectRef idx="0">
+            <a:schemeClr val="accent1"/>
+          </a:effectRef>
+          <a:fontRef idx="minor"/>
+        </p:style>
+        <p:txBody>
+          <a:bodyPr lIns="56250" tIns="28125" rIns="56250" bIns="28125" anchor="ctr">
+            <a:noAutofit/>
+          </a:bodyPr>
+          <a:lstStyle/>
+          <a:p>
+            <a:pPr algn="ctr"/>
+            <a:r>
+              <a:rPr lang="en-US" sz="1000" spc="-1">
+                <a:solidFill>
+                  <a:srgbClr val="FFFFFF"/>
+                </a:solidFill>
+                <a:latin typeface="Arial"/>
+              </a:rPr>
+              <a:t>SysConfig</a:t>
+            </a:r>
+            <a:endParaRPr lang="en-IN" sz="1000" spc="-1" dirty="0">
+              <a:solidFill>
+                <a:srgbClr val="FFFFFF"/>
+              </a:solidFill>
+              <a:latin typeface="Arial"/>
+            </a:endParaRPr>
+          </a:p>
+        </p:txBody>
+      </p:sp>
+      <p:sp>
+        <p:nvSpPr>
+          <p:cNvPr id="108" name="CustomShape 19">
+            <a:extLst>
+              <a:ext uri="{FF2B5EF4-FFF2-40B4-BE49-F238E27FC236}">
+                <a16:creationId xmlns:a16="http://schemas.microsoft.com/office/drawing/2014/main" id="{8EDCC865-568A-435E-BF7C-851D917BF793}"/>
+              </a:ext>
+            </a:extLst>
+          </p:cNvPr>
+          <p:cNvSpPr/>
+          <p:nvPr/>
+        </p:nvSpPr>
+        <p:spPr>
+          <a:xfrm>
+            <a:off x="7307669" y="3115268"/>
+            <a:ext cx="1001475" cy="453183"/>
+          </a:xfrm>
+          <a:prstGeom prst="rect">
+            <a:avLst/>
+          </a:prstGeom>
+          <a:solidFill>
+            <a:schemeClr val="bg2"/>
+          </a:solidFill>
+          <a:ln>
+            <a:noFill/>
+          </a:ln>
+          <a:effectLst>
+            <a:outerShdw blurRad="50760" dist="37674" dir="2700000" algn="tl" rotWithShape="0">
+              <a:srgbClr val="000000">
+                <a:alpha val="40000"/>
+              </a:srgbClr>
+            </a:outerShdw>
+          </a:effectLst>
+        </p:spPr>
+        <p:style>
+          <a:lnRef idx="2">
+            <a:schemeClr val="accent1">
+              <a:shade val="50000"/>
+            </a:schemeClr>
+          </a:lnRef>
+          <a:fillRef idx="1">
+            <a:schemeClr val="accent1"/>
+          </a:fillRef>
+          <a:effectRef idx="0">
+            <a:schemeClr val="accent1"/>
+          </a:effectRef>
+          <a:fontRef idx="minor"/>
+        </p:style>
+        <p:txBody>
+          <a:bodyPr lIns="56250" tIns="28125" rIns="56250" bIns="28125" anchor="ctr">
+            <a:noAutofit/>
+          </a:bodyPr>
+          <a:lstStyle/>
+          <a:p>
+            <a:pPr algn="ctr"/>
+            <a:r>
+              <a:rPr lang="en-US" sz="1000" spc="-1" dirty="0">
+                <a:solidFill>
+                  <a:srgbClr val="FFFFFF"/>
+                </a:solidFill>
+                <a:latin typeface="Arial"/>
+              </a:rPr>
+              <a:t>Code Composer Studio (CCS)</a:t>
+            </a:r>
+            <a:endParaRPr lang="en-IN" sz="1000" spc="-1" dirty="0">
+              <a:solidFill>
+                <a:srgbClr val="FFFFFF"/>
+              </a:solidFill>
+              <a:latin typeface="Arial"/>
+            </a:endParaRPr>
+          </a:p>
+        </p:txBody>
+      </p:sp>
+      <p:sp>
+        <p:nvSpPr>
+          <p:cNvPr id="109" name="CustomShape 20">
+            <a:extLst>
+              <a:ext uri="{FF2B5EF4-FFF2-40B4-BE49-F238E27FC236}">
+                <a16:creationId xmlns:a16="http://schemas.microsoft.com/office/drawing/2014/main" id="{A0D9FC60-4F5B-4105-8563-5EFE48BD0569}"/>
+              </a:ext>
+            </a:extLst>
+          </p:cNvPr>
+          <p:cNvSpPr/>
+          <p:nvPr/>
+        </p:nvSpPr>
+        <p:spPr>
+          <a:xfrm>
+            <a:off x="7307669" y="2650706"/>
+            <a:ext cx="1001475" cy="388350"/>
+          </a:xfrm>
+          <a:prstGeom prst="rect">
+            <a:avLst/>
+          </a:prstGeom>
+          <a:solidFill>
+            <a:schemeClr val="bg2"/>
+          </a:solidFill>
+          <a:ln>
+            <a:noFill/>
+          </a:ln>
+          <a:effectLst>
+            <a:outerShdw blurRad="50760" dist="37674" dir="2700000" algn="tl" rotWithShape="0">
+              <a:srgbClr val="000000">
+                <a:alpha val="40000"/>
+              </a:srgbClr>
+            </a:outerShdw>
+          </a:effectLst>
+        </p:spPr>
+        <p:style>
+          <a:lnRef idx="2">
+            <a:schemeClr val="accent1">
+              <a:shade val="50000"/>
+            </a:schemeClr>
+          </a:lnRef>
+          <a:fillRef idx="1">
+            <a:schemeClr val="accent1"/>
+          </a:fillRef>
+          <a:effectRef idx="0">
+            <a:schemeClr val="accent1"/>
+          </a:effectRef>
+          <a:fontRef idx="minor"/>
+        </p:style>
+        <p:txBody>
+          <a:bodyPr lIns="56250" tIns="28125" rIns="56250" bIns="28125" anchor="ctr">
+            <a:noAutofit/>
+          </a:bodyPr>
+          <a:lstStyle/>
+          <a:p>
+            <a:pPr algn="ctr"/>
+            <a:r>
+              <a:rPr lang="en-US" sz="1000" spc="-1" dirty="0">
+                <a:solidFill>
+                  <a:srgbClr val="FFFFFF"/>
+                </a:solidFill>
+                <a:latin typeface="Arial"/>
+              </a:rPr>
+              <a:t>TI CLANG Compiler</a:t>
+            </a:r>
+            <a:endParaRPr lang="en-IN" sz="1000" spc="-1" dirty="0">
+              <a:solidFill>
+                <a:srgbClr val="FFFFFF"/>
+              </a:solidFill>
+              <a:latin typeface="Arial"/>
+            </a:endParaRPr>
+          </a:p>
+        </p:txBody>
+      </p:sp>
+      <p:sp>
+        <p:nvSpPr>
+          <p:cNvPr id="110" name="CustomShape 21">
+            <a:extLst>
+              <a:ext uri="{FF2B5EF4-FFF2-40B4-BE49-F238E27FC236}">
+                <a16:creationId xmlns:a16="http://schemas.microsoft.com/office/drawing/2014/main" id="{09D8FDC2-2E2B-4C96-9E1C-41CEC48BD62A}"/>
+              </a:ext>
+            </a:extLst>
+          </p:cNvPr>
+          <p:cNvSpPr/>
+          <p:nvPr/>
+        </p:nvSpPr>
+        <p:spPr>
+          <a:xfrm>
+            <a:off x="7307669" y="1770312"/>
+            <a:ext cx="1001475" cy="436246"/>
+          </a:xfrm>
+          <a:prstGeom prst="rect">
+            <a:avLst/>
+          </a:prstGeom>
+          <a:solidFill>
+            <a:schemeClr val="bg2"/>
+          </a:solidFill>
+          <a:ln>
+            <a:noFill/>
+          </a:ln>
+          <a:effectLst>
+            <a:outerShdw blurRad="50760" dist="37674" dir="2700000" algn="tl" rotWithShape="0">
+              <a:srgbClr val="000000">
+                <a:alpha val="40000"/>
+              </a:srgbClr>
+            </a:outerShdw>
+          </a:effectLst>
+        </p:spPr>
+        <p:style>
+          <a:lnRef idx="2">
+            <a:schemeClr val="accent1">
+              <a:shade val="50000"/>
+            </a:schemeClr>
+          </a:lnRef>
+          <a:fillRef idx="1">
+            <a:schemeClr val="accent1"/>
+          </a:fillRef>
+          <a:effectRef idx="0">
+            <a:schemeClr val="accent1"/>
+          </a:effectRef>
+          <a:fontRef idx="minor"/>
+        </p:style>
+        <p:txBody>
+          <a:bodyPr lIns="56250" tIns="28125" rIns="56250" bIns="28125" anchor="ctr">
+            <a:noAutofit/>
+          </a:bodyPr>
+          <a:lstStyle/>
+          <a:p>
+            <a:pPr algn="ctr"/>
+            <a:r>
+              <a:rPr lang="en-US" sz="1000" spc="-1" dirty="0">
+                <a:solidFill>
+                  <a:srgbClr val="FFFFFF"/>
+                </a:solidFill>
+                <a:latin typeface="Arial"/>
+              </a:rPr>
+              <a:t>TI Resource Explorer (TIREX)</a:t>
+            </a:r>
+            <a:endParaRPr lang="en-IN" sz="1000" spc="-1" dirty="0">
+              <a:solidFill>
+                <a:srgbClr val="FFFFFF"/>
+              </a:solidFill>
+              <a:latin typeface="Arial"/>
+            </a:endParaRPr>
+          </a:p>
+        </p:txBody>
+      </p:sp>
+      <p:sp>
+        <p:nvSpPr>
+          <p:cNvPr id="111" name="CustomShape 22">
+            <a:extLst>
+              <a:ext uri="{FF2B5EF4-FFF2-40B4-BE49-F238E27FC236}">
+                <a16:creationId xmlns:a16="http://schemas.microsoft.com/office/drawing/2014/main" id="{EB428E7A-3FA5-49EF-BD88-DE4809590EBB}"/>
+              </a:ext>
+            </a:extLst>
+          </p:cNvPr>
+          <p:cNvSpPr/>
+          <p:nvPr/>
+        </p:nvSpPr>
+        <p:spPr>
+          <a:xfrm>
+            <a:off x="585455" y="3695067"/>
+            <a:ext cx="5564342" cy="335592"/>
+          </a:xfrm>
+          <a:prstGeom prst="rect">
+            <a:avLst/>
+          </a:prstGeom>
+          <a:solidFill>
+            <a:schemeClr val="tx1"/>
+          </a:solidFill>
+          <a:ln>
+            <a:noFill/>
+          </a:ln>
+        </p:spPr>
+        <p:style>
+          <a:lnRef idx="2">
+            <a:schemeClr val="accent1">
+              <a:shade val="50000"/>
+            </a:schemeClr>
+          </a:lnRef>
+          <a:fillRef idx="1">
+            <a:schemeClr val="accent1"/>
+          </a:fillRef>
+          <a:effectRef idx="0">
+            <a:schemeClr val="accent1"/>
+          </a:effectRef>
+          <a:fontRef idx="minor"/>
+        </p:style>
+        <p:txBody>
+          <a:bodyPr lIns="56250" tIns="28125" rIns="56250" bIns="28125" anchor="ctr">
+            <a:noAutofit/>
+          </a:bodyPr>
+          <a:lstStyle/>
+          <a:p>
+            <a:pPr algn="ctr">
+              <a:lnSpc>
+                <a:spcPct val="100000"/>
+              </a:lnSpc>
+              <a:buNone/>
+            </a:pPr>
+            <a:r>
+              <a:rPr lang="en-US" sz="1000" spc="-1" dirty="0">
+                <a:solidFill>
+                  <a:srgbClr val="FFFFFF"/>
+                </a:solidFill>
+                <a:latin typeface="Arial"/>
+                <a:ea typeface="DejaVu Sans"/>
+              </a:rPr>
+              <a:t>ARM A53, ARM R5F, ARM M4F + SOC peripherals + EVM peripherals</a:t>
+            </a:r>
+            <a:endParaRPr lang="en-IN" sz="1000" spc="-1" dirty="0">
+              <a:latin typeface="Arial"/>
+            </a:endParaRPr>
+          </a:p>
+        </p:txBody>
+      </p:sp>
+      <p:sp>
+        <p:nvSpPr>
+          <p:cNvPr id="112" name="CustomShape 23">
+            <a:extLst>
+              <a:ext uri="{FF2B5EF4-FFF2-40B4-BE49-F238E27FC236}">
+                <a16:creationId xmlns:a16="http://schemas.microsoft.com/office/drawing/2014/main" id="{03A1A3BF-D144-4FDC-942A-8AA5E0B37952}"/>
+              </a:ext>
+            </a:extLst>
+          </p:cNvPr>
+          <p:cNvSpPr/>
+          <p:nvPr/>
+        </p:nvSpPr>
+        <p:spPr>
+          <a:xfrm>
+            <a:off x="7214294" y="3702942"/>
+            <a:ext cx="1197900" cy="327717"/>
+          </a:xfrm>
+          <a:prstGeom prst="rect">
+            <a:avLst/>
+          </a:prstGeom>
+          <a:solidFill>
+            <a:schemeClr val="tx1"/>
+          </a:solidFill>
+          <a:ln>
+            <a:noFill/>
+          </a:ln>
+        </p:spPr>
+        <p:style>
+          <a:lnRef idx="2">
+            <a:schemeClr val="accent1">
+              <a:shade val="50000"/>
+            </a:schemeClr>
+          </a:lnRef>
+          <a:fillRef idx="1">
+            <a:schemeClr val="accent1"/>
+          </a:fillRef>
+          <a:effectRef idx="0">
+            <a:schemeClr val="accent1"/>
+          </a:effectRef>
+          <a:fontRef idx="minor"/>
+        </p:style>
+        <p:txBody>
+          <a:bodyPr lIns="56250" tIns="28125" rIns="56250" bIns="28125" anchor="ctr">
+            <a:noAutofit/>
+          </a:bodyPr>
+          <a:lstStyle/>
+          <a:p>
+            <a:pPr algn="ctr">
+              <a:lnSpc>
+                <a:spcPct val="100000"/>
+              </a:lnSpc>
+              <a:buNone/>
+            </a:pPr>
+            <a:r>
+              <a:rPr lang="en-US" sz="1000" spc="-1" dirty="0">
+                <a:solidFill>
+                  <a:srgbClr val="FFFFFF"/>
+                </a:solidFill>
+                <a:latin typeface="Arial"/>
+                <a:ea typeface="DejaVu Sans"/>
+              </a:rPr>
+              <a:t>X86 Host (Windows / Linux)</a:t>
+            </a:r>
+            <a:endParaRPr lang="en-IN" sz="1000" spc="-1" dirty="0">
+              <a:latin typeface="Arial"/>
+            </a:endParaRPr>
+          </a:p>
+        </p:txBody>
+      </p:sp>
+      <p:sp>
+        <p:nvSpPr>
+          <p:cNvPr id="113" name="CustomShape 24">
+            <a:extLst>
+              <a:ext uri="{FF2B5EF4-FFF2-40B4-BE49-F238E27FC236}">
+                <a16:creationId xmlns:a16="http://schemas.microsoft.com/office/drawing/2014/main" id="{F7FC4F91-0E6E-4B6E-BF07-BC51B5C929A5}"/>
+              </a:ext>
+            </a:extLst>
+          </p:cNvPr>
+          <p:cNvSpPr/>
+          <p:nvPr/>
+        </p:nvSpPr>
+        <p:spPr>
+          <a:xfrm>
+            <a:off x="1985077" y="1147678"/>
+            <a:ext cx="677087" cy="281025"/>
+          </a:xfrm>
+          <a:prstGeom prst="rect">
+            <a:avLst/>
+          </a:prstGeom>
+          <a:solidFill>
+            <a:srgbClr val="92D050"/>
+          </a:solidFill>
+          <a:ln>
+            <a:noFill/>
+          </a:ln>
+          <a:effectLst>
+            <a:outerShdw blurRad="50760" dist="37674" dir="2700000" algn="tl" rotWithShape="0">
+              <a:srgbClr val="000000">
+                <a:alpha val="40000"/>
+              </a:srgbClr>
+            </a:outerShdw>
+          </a:effectLst>
+        </p:spPr>
+        <p:style>
+          <a:lnRef idx="2">
+            <a:schemeClr val="accent1">
+              <a:shade val="50000"/>
+            </a:schemeClr>
+          </a:lnRef>
+          <a:fillRef idx="1">
+            <a:schemeClr val="accent1"/>
+          </a:fillRef>
+          <a:effectRef idx="0">
+            <a:schemeClr val="accent1"/>
+          </a:effectRef>
+          <a:fontRef idx="minor"/>
+        </p:style>
+        <p:txBody>
+          <a:bodyPr lIns="56250" tIns="28125" rIns="56250" bIns="28125" anchor="ctr">
+            <a:noAutofit/>
+          </a:bodyPr>
+          <a:lstStyle/>
+          <a:p>
+            <a:pPr algn="ctr"/>
+            <a:r>
+              <a:rPr lang="en-US" sz="800" spc="-1">
+                <a:solidFill>
+                  <a:srgbClr val="000000"/>
+                </a:solidFill>
+              </a:rPr>
+              <a:t>EtherCAT</a:t>
+            </a:r>
+            <a:endParaRPr lang="en-IN" sz="800" spc="-1" dirty="0">
+              <a:solidFill>
+                <a:srgbClr val="000000"/>
+              </a:solidFill>
+            </a:endParaRPr>
+          </a:p>
+        </p:txBody>
+      </p:sp>
+      <p:sp>
+        <p:nvSpPr>
+          <p:cNvPr id="114" name="CustomShape 25">
+            <a:extLst>
+              <a:ext uri="{FF2B5EF4-FFF2-40B4-BE49-F238E27FC236}">
+                <a16:creationId xmlns:a16="http://schemas.microsoft.com/office/drawing/2014/main" id="{DCFBB7F5-443D-4495-A25F-BDA3B199691F}"/>
+              </a:ext>
+            </a:extLst>
+          </p:cNvPr>
+          <p:cNvSpPr/>
+          <p:nvPr/>
+        </p:nvSpPr>
+        <p:spPr>
+          <a:xfrm>
+            <a:off x="7305981" y="1150682"/>
+            <a:ext cx="1001475" cy="544190"/>
+          </a:xfrm>
+          <a:prstGeom prst="rect">
+            <a:avLst/>
+          </a:prstGeom>
+          <a:solidFill>
+            <a:schemeClr val="bg2"/>
+          </a:solidFill>
+          <a:ln>
+            <a:noFill/>
+          </a:ln>
+          <a:effectLst>
+            <a:outerShdw blurRad="50760" dist="37674" dir="2700000" algn="tl" rotWithShape="0">
+              <a:srgbClr val="000000">
+                <a:alpha val="40000"/>
+              </a:srgbClr>
+            </a:outerShdw>
+          </a:effectLst>
+        </p:spPr>
+        <p:style>
+          <a:lnRef idx="2">
+            <a:schemeClr val="accent1">
+              <a:shade val="50000"/>
+            </a:schemeClr>
+          </a:lnRef>
+          <a:fillRef idx="1">
+            <a:schemeClr val="accent1"/>
+          </a:fillRef>
+          <a:effectRef idx="0">
+            <a:schemeClr val="accent1"/>
+          </a:effectRef>
+          <a:fontRef idx="minor"/>
+        </p:style>
+        <p:txBody>
+          <a:bodyPr lIns="56250" tIns="28125" rIns="56250" bIns="28125" anchor="ctr">
+            <a:noAutofit/>
+          </a:bodyPr>
+          <a:lstStyle/>
+          <a:p>
+            <a:pPr algn="ctr"/>
+            <a:r>
+              <a:rPr lang="en-US" sz="1000" spc="-1" dirty="0">
+                <a:solidFill>
+                  <a:srgbClr val="FFFFFF"/>
+                </a:solidFill>
+                <a:latin typeface="Arial"/>
+              </a:rPr>
+              <a:t>SDK Tools (Flashing, Boot, …)</a:t>
+            </a:r>
+            <a:endParaRPr lang="en-IN" sz="1000" spc="-1" dirty="0">
+              <a:solidFill>
+                <a:srgbClr val="FFFFFF"/>
+              </a:solidFill>
+              <a:latin typeface="Arial"/>
+            </a:endParaRPr>
+          </a:p>
+        </p:txBody>
+      </p:sp>
+      <p:sp>
+        <p:nvSpPr>
+          <p:cNvPr id="115" name="CustomShape 26">
+            <a:extLst>
+              <a:ext uri="{FF2B5EF4-FFF2-40B4-BE49-F238E27FC236}">
+                <a16:creationId xmlns:a16="http://schemas.microsoft.com/office/drawing/2014/main" id="{448D405C-0F0C-446E-8E4D-572852DFD20C}"/>
+              </a:ext>
+            </a:extLst>
+          </p:cNvPr>
+          <p:cNvSpPr/>
+          <p:nvPr/>
+        </p:nvSpPr>
+        <p:spPr>
+          <a:xfrm>
+            <a:off x="1683529" y="1808889"/>
+            <a:ext cx="660291" cy="324519"/>
+          </a:xfrm>
+          <a:prstGeom prst="rect">
+            <a:avLst/>
+          </a:prstGeom>
+          <a:solidFill>
+            <a:schemeClr val="bg2"/>
+          </a:solidFill>
+          <a:ln>
+            <a:noFill/>
+          </a:ln>
+          <a:effectLst>
+            <a:outerShdw blurRad="50760" dist="37674" dir="2700000" algn="tl" rotWithShape="0">
+              <a:srgbClr val="000000">
+                <a:alpha val="40000"/>
+              </a:srgbClr>
+            </a:outerShdw>
+          </a:effectLst>
+        </p:spPr>
+        <p:style>
+          <a:lnRef idx="2">
+            <a:schemeClr val="accent1">
+              <a:shade val="50000"/>
+            </a:schemeClr>
+          </a:lnRef>
+          <a:fillRef idx="1">
+            <a:schemeClr val="accent1"/>
+          </a:fillRef>
+          <a:effectRef idx="0">
+            <a:schemeClr val="accent1"/>
+          </a:effectRef>
+          <a:fontRef idx="minor"/>
+        </p:style>
+        <p:txBody>
+          <a:bodyPr lIns="56250" tIns="28125" rIns="56250" bIns="28125" anchor="ctr">
+            <a:noAutofit/>
+          </a:bodyPr>
+          <a:lstStyle/>
+          <a:p>
+            <a:pPr algn="ctr"/>
+            <a:r>
+              <a:rPr lang="en-US" sz="800" spc="-1" dirty="0" err="1">
+                <a:solidFill>
+                  <a:srgbClr val="FFFFFF"/>
+                </a:solidFill>
+                <a:latin typeface="Arial"/>
+              </a:rPr>
+              <a:t>LwIP</a:t>
+            </a:r>
+            <a:r>
+              <a:rPr lang="en-US" sz="800" spc="-1" dirty="0">
+                <a:solidFill>
+                  <a:srgbClr val="FFFFFF"/>
+                </a:solidFill>
+                <a:latin typeface="Arial"/>
+              </a:rPr>
+              <a:t>  (TCP/UDP)</a:t>
+            </a:r>
+            <a:endParaRPr lang="en-IN" sz="800" spc="-1" dirty="0">
+              <a:solidFill>
+                <a:srgbClr val="FFFFFF"/>
+              </a:solidFill>
+              <a:latin typeface="Arial"/>
+            </a:endParaRPr>
+          </a:p>
+        </p:txBody>
+      </p:sp>
+      <p:sp>
+        <p:nvSpPr>
+          <p:cNvPr id="116" name="CustomShape 15">
+            <a:extLst>
+              <a:ext uri="{FF2B5EF4-FFF2-40B4-BE49-F238E27FC236}">
+                <a16:creationId xmlns:a16="http://schemas.microsoft.com/office/drawing/2014/main" id="{F6FC5D3D-7F8F-4A27-81E5-BD63D465D11E}"/>
+              </a:ext>
+            </a:extLst>
+          </p:cNvPr>
+          <p:cNvSpPr/>
+          <p:nvPr/>
+        </p:nvSpPr>
+        <p:spPr>
+          <a:xfrm>
+            <a:off x="3644727" y="2481330"/>
+            <a:ext cx="596853" cy="310587"/>
+          </a:xfrm>
+          <a:prstGeom prst="rect">
+            <a:avLst/>
+          </a:prstGeom>
+          <a:solidFill>
+            <a:srgbClr val="92D050"/>
+          </a:solidFill>
+          <a:ln>
+            <a:noFill/>
+          </a:ln>
+          <a:effectLst>
+            <a:outerShdw blurRad="50760" dist="37674" dir="2700000" algn="tl" rotWithShape="0">
+              <a:srgbClr val="000000">
+                <a:alpha val="40000"/>
+              </a:srgbClr>
+            </a:outerShdw>
+          </a:effectLst>
+        </p:spPr>
+        <p:style>
+          <a:lnRef idx="2">
+            <a:schemeClr val="accent1">
+              <a:shade val="50000"/>
+            </a:schemeClr>
+          </a:lnRef>
+          <a:fillRef idx="1">
+            <a:schemeClr val="accent1"/>
+          </a:fillRef>
+          <a:effectRef idx="0">
+            <a:schemeClr val="accent1"/>
+          </a:effectRef>
+          <a:fontRef idx="minor"/>
+        </p:style>
+        <p:txBody>
+          <a:bodyPr lIns="56250" tIns="28125" rIns="56250" bIns="28125" anchor="ctr">
+            <a:noAutofit/>
+          </a:bodyPr>
+          <a:lstStyle/>
+          <a:p>
+            <a:pPr algn="ctr"/>
+            <a:r>
+              <a:rPr lang="en-US" sz="800" spc="-1" dirty="0" err="1">
+                <a:solidFill>
+                  <a:srgbClr val="000000"/>
+                </a:solidFill>
+                <a:latin typeface="Arial"/>
+              </a:rPr>
+              <a:t>EtherCAT</a:t>
+            </a:r>
+            <a:r>
+              <a:rPr lang="en-US" sz="800" spc="-1" dirty="0">
+                <a:solidFill>
+                  <a:srgbClr val="000000"/>
+                </a:solidFill>
+                <a:latin typeface="Arial"/>
+              </a:rPr>
+              <a:t> FW HAL</a:t>
+            </a:r>
+            <a:endParaRPr lang="en-IN" sz="800" spc="-1" dirty="0">
+              <a:solidFill>
+                <a:srgbClr val="000000"/>
+              </a:solidFill>
+              <a:latin typeface="Arial"/>
+            </a:endParaRPr>
+          </a:p>
+        </p:txBody>
+      </p:sp>
+      <p:sp>
+        <p:nvSpPr>
+          <p:cNvPr id="117" name="CustomShape 15">
+            <a:extLst>
+              <a:ext uri="{FF2B5EF4-FFF2-40B4-BE49-F238E27FC236}">
+                <a16:creationId xmlns:a16="http://schemas.microsoft.com/office/drawing/2014/main" id="{72044023-059A-4FA2-830A-F4A2A114345F}"/>
+              </a:ext>
+            </a:extLst>
+          </p:cNvPr>
+          <p:cNvSpPr/>
+          <p:nvPr/>
+        </p:nvSpPr>
+        <p:spPr>
+          <a:xfrm>
+            <a:off x="4289404" y="2490666"/>
+            <a:ext cx="598130" cy="315079"/>
+          </a:xfrm>
+          <a:prstGeom prst="rect">
+            <a:avLst/>
+          </a:prstGeom>
+          <a:solidFill>
+            <a:srgbClr val="92D050"/>
+          </a:solidFill>
+          <a:ln>
+            <a:noFill/>
+          </a:ln>
+          <a:effectLst>
+            <a:outerShdw blurRad="50760" dist="37674" dir="2700000" algn="tl" rotWithShape="0">
+              <a:srgbClr val="000000">
+                <a:alpha val="40000"/>
+              </a:srgbClr>
+            </a:outerShdw>
+          </a:effectLst>
+        </p:spPr>
+        <p:style>
+          <a:lnRef idx="2">
+            <a:schemeClr val="accent1">
+              <a:shade val="50000"/>
+            </a:schemeClr>
+          </a:lnRef>
+          <a:fillRef idx="1">
+            <a:schemeClr val="accent1"/>
+          </a:fillRef>
+          <a:effectRef idx="0">
+            <a:schemeClr val="accent1"/>
+          </a:effectRef>
+          <a:fontRef idx="minor"/>
+        </p:style>
+        <p:txBody>
+          <a:bodyPr lIns="56250" tIns="28125" rIns="56250" bIns="28125" anchor="ctr">
+            <a:noAutofit/>
+          </a:bodyPr>
+          <a:lstStyle/>
+          <a:p>
+            <a:pPr algn="ctr"/>
+            <a:r>
+              <a:rPr lang="en-US" sz="800" spc="-1" dirty="0" err="1">
+                <a:solidFill>
+                  <a:srgbClr val="000000"/>
+                </a:solidFill>
+                <a:latin typeface="Arial"/>
+              </a:rPr>
+              <a:t>EtherNet</a:t>
+            </a:r>
+            <a:r>
+              <a:rPr lang="en-US" sz="800" spc="-1" dirty="0">
+                <a:solidFill>
+                  <a:srgbClr val="000000"/>
+                </a:solidFill>
+                <a:latin typeface="Arial"/>
+              </a:rPr>
+              <a:t>/IP FW HAL</a:t>
+            </a:r>
+            <a:endParaRPr lang="en-IN" sz="800" spc="-1" dirty="0">
+              <a:solidFill>
+                <a:srgbClr val="000000"/>
+              </a:solidFill>
+              <a:latin typeface="Arial"/>
+            </a:endParaRPr>
+          </a:p>
+        </p:txBody>
+      </p:sp>
+      <p:sp>
+        <p:nvSpPr>
+          <p:cNvPr id="118" name="CustomShape 15">
+            <a:extLst>
+              <a:ext uri="{FF2B5EF4-FFF2-40B4-BE49-F238E27FC236}">
+                <a16:creationId xmlns:a16="http://schemas.microsoft.com/office/drawing/2014/main" id="{19BA375C-0037-455C-9403-5FAD7F7FFC3C}"/>
+              </a:ext>
+            </a:extLst>
+          </p:cNvPr>
+          <p:cNvSpPr/>
+          <p:nvPr/>
+        </p:nvSpPr>
+        <p:spPr>
+          <a:xfrm>
+            <a:off x="5492957" y="2477660"/>
+            <a:ext cx="598130" cy="315079"/>
+          </a:xfrm>
+          <a:prstGeom prst="rect">
+            <a:avLst/>
+          </a:prstGeom>
+          <a:solidFill>
+            <a:srgbClr val="92D050"/>
+          </a:solidFill>
+          <a:ln>
+            <a:noFill/>
+          </a:ln>
+          <a:effectLst>
+            <a:outerShdw blurRad="50760" dist="37674" dir="2700000" algn="tl" rotWithShape="0">
+              <a:srgbClr val="000000">
+                <a:alpha val="40000"/>
+              </a:srgbClr>
+            </a:outerShdw>
+          </a:effectLst>
+        </p:spPr>
+        <p:style>
+          <a:lnRef idx="2">
+            <a:schemeClr val="accent1">
+              <a:shade val="50000"/>
+            </a:schemeClr>
+          </a:lnRef>
+          <a:fillRef idx="1">
+            <a:schemeClr val="accent1"/>
+          </a:fillRef>
+          <a:effectRef idx="0">
+            <a:schemeClr val="accent1"/>
+          </a:effectRef>
+          <a:fontRef idx="minor"/>
+        </p:style>
+        <p:txBody>
+          <a:bodyPr lIns="56250" tIns="28125" rIns="56250" bIns="28125" anchor="ctr">
+            <a:noAutofit/>
+          </a:bodyPr>
+          <a:lstStyle/>
+          <a:p>
+            <a:pPr algn="ctr">
+              <a:lnSpc>
+                <a:spcPct val="100000"/>
+              </a:lnSpc>
+              <a:buNone/>
+            </a:pPr>
+            <a:r>
+              <a:rPr lang="en-US" sz="800" spc="-1" dirty="0">
+                <a:solidFill>
+                  <a:srgbClr val="000000"/>
+                </a:solidFill>
+                <a:latin typeface="Arial"/>
+                <a:ea typeface="DejaVu Sans"/>
+              </a:rPr>
+              <a:t>HSR/PRP FW HAL</a:t>
+            </a:r>
+            <a:endParaRPr lang="en-IN" sz="800" spc="-1" dirty="0">
+              <a:latin typeface="Arial"/>
+            </a:endParaRPr>
+          </a:p>
+        </p:txBody>
+      </p:sp>
+      <p:sp>
+        <p:nvSpPr>
+          <p:cNvPr id="122" name="CustomShape 13">
+            <a:extLst>
+              <a:ext uri="{FF2B5EF4-FFF2-40B4-BE49-F238E27FC236}">
+                <a16:creationId xmlns:a16="http://schemas.microsoft.com/office/drawing/2014/main" id="{CB470632-7412-49E6-9251-4BC2A9470616}"/>
+              </a:ext>
+            </a:extLst>
+          </p:cNvPr>
+          <p:cNvSpPr/>
+          <p:nvPr/>
+        </p:nvSpPr>
+        <p:spPr>
+          <a:xfrm>
+            <a:off x="2441472" y="1837507"/>
+            <a:ext cx="660291" cy="261225"/>
+          </a:xfrm>
+          <a:prstGeom prst="rect">
+            <a:avLst/>
+          </a:prstGeom>
+          <a:solidFill>
+            <a:srgbClr val="92D050"/>
+          </a:solidFill>
+          <a:ln>
+            <a:noFill/>
+          </a:ln>
+          <a:effectLst>
+            <a:outerShdw blurRad="50760" dist="37674" dir="2700000" algn="tl" rotWithShape="0">
+              <a:srgbClr val="000000">
+                <a:alpha val="40000"/>
+              </a:srgbClr>
+            </a:outerShdw>
+          </a:effectLst>
+        </p:spPr>
+        <p:style>
+          <a:lnRef idx="2">
+            <a:schemeClr val="accent1">
+              <a:shade val="50000"/>
+            </a:schemeClr>
+          </a:lnRef>
+          <a:fillRef idx="1">
+            <a:schemeClr val="accent1"/>
+          </a:fillRef>
+          <a:effectRef idx="0">
+            <a:schemeClr val="accent1"/>
+          </a:effectRef>
+          <a:fontRef idx="minor"/>
+        </p:style>
+        <p:txBody>
+          <a:bodyPr lIns="56250" tIns="28125" rIns="56250" bIns="28125" anchor="ctr">
+            <a:noAutofit/>
+          </a:bodyPr>
+          <a:lstStyle/>
+          <a:p>
+            <a:pPr algn="ctr"/>
+            <a:r>
+              <a:rPr lang="en-US" sz="800" spc="-1">
+                <a:solidFill>
+                  <a:srgbClr val="000000"/>
+                </a:solidFill>
+                <a:latin typeface="Arial"/>
+              </a:rPr>
+              <a:t>EtherCAT</a:t>
+            </a:r>
+            <a:endParaRPr lang="en-IN" sz="800" spc="-1" dirty="0">
+              <a:solidFill>
+                <a:srgbClr val="000000"/>
+              </a:solidFill>
+              <a:latin typeface="Arial"/>
+            </a:endParaRPr>
+          </a:p>
+        </p:txBody>
+      </p:sp>
+      <p:sp>
+        <p:nvSpPr>
+          <p:cNvPr id="123" name="CustomShape 13">
+            <a:extLst>
+              <a:ext uri="{FF2B5EF4-FFF2-40B4-BE49-F238E27FC236}">
+                <a16:creationId xmlns:a16="http://schemas.microsoft.com/office/drawing/2014/main" id="{82E17F80-BB62-4003-94D5-1DE033FF00FF}"/>
+              </a:ext>
+            </a:extLst>
+          </p:cNvPr>
+          <p:cNvSpPr/>
+          <p:nvPr/>
+        </p:nvSpPr>
+        <p:spPr>
+          <a:xfrm>
+            <a:off x="3199154" y="1835591"/>
+            <a:ext cx="661490" cy="261225"/>
+          </a:xfrm>
+          <a:prstGeom prst="rect">
+            <a:avLst/>
+          </a:prstGeom>
+          <a:solidFill>
+            <a:srgbClr val="92D050"/>
+          </a:solidFill>
+          <a:ln>
+            <a:noFill/>
+          </a:ln>
+          <a:effectLst>
+            <a:outerShdw blurRad="50760" dist="37674" dir="2700000" algn="tl" rotWithShape="0">
+              <a:srgbClr val="000000">
+                <a:alpha val="40000"/>
+              </a:srgbClr>
+            </a:outerShdw>
+          </a:effectLst>
+        </p:spPr>
+        <p:style>
+          <a:lnRef idx="2">
+            <a:schemeClr val="accent1">
+              <a:shade val="50000"/>
+            </a:schemeClr>
+          </a:lnRef>
+          <a:fillRef idx="1">
+            <a:schemeClr val="accent1"/>
+          </a:fillRef>
+          <a:effectRef idx="0">
+            <a:schemeClr val="accent1"/>
+          </a:effectRef>
+          <a:fontRef idx="minor"/>
+        </p:style>
+        <p:txBody>
+          <a:bodyPr lIns="56250" tIns="28125" rIns="56250" bIns="28125" anchor="ctr">
+            <a:noAutofit/>
+          </a:bodyPr>
+          <a:lstStyle/>
+          <a:p>
+            <a:pPr algn="ctr"/>
+            <a:r>
+              <a:rPr lang="en-US" sz="800" spc="-1" dirty="0" err="1">
+                <a:solidFill>
+                  <a:srgbClr val="000000"/>
+                </a:solidFill>
+                <a:latin typeface="Arial"/>
+              </a:rPr>
+              <a:t>EtherNet</a:t>
+            </a:r>
+            <a:r>
+              <a:rPr lang="en-US" sz="800" spc="-1" dirty="0">
+                <a:solidFill>
+                  <a:srgbClr val="000000"/>
+                </a:solidFill>
+                <a:latin typeface="Arial"/>
+              </a:rPr>
+              <a:t>/IP</a:t>
+            </a:r>
+            <a:endParaRPr lang="en-IN" sz="800" spc="-1" dirty="0">
+              <a:solidFill>
+                <a:srgbClr val="000000"/>
+              </a:solidFill>
+              <a:latin typeface="Arial"/>
+            </a:endParaRPr>
+          </a:p>
+        </p:txBody>
+      </p:sp>
+      <p:sp>
+        <p:nvSpPr>
+          <p:cNvPr id="125" name="CustomShape 13">
+            <a:extLst>
+              <a:ext uri="{FF2B5EF4-FFF2-40B4-BE49-F238E27FC236}">
+                <a16:creationId xmlns:a16="http://schemas.microsoft.com/office/drawing/2014/main" id="{15F42B19-1522-4C34-8453-0A9DF926371C}"/>
+              </a:ext>
+            </a:extLst>
+          </p:cNvPr>
+          <p:cNvSpPr/>
+          <p:nvPr/>
+        </p:nvSpPr>
+        <p:spPr>
+          <a:xfrm>
+            <a:off x="3956581" y="1844101"/>
+            <a:ext cx="501106" cy="261225"/>
+          </a:xfrm>
+          <a:prstGeom prst="rect">
+            <a:avLst/>
+          </a:prstGeom>
+          <a:solidFill>
+            <a:srgbClr val="92D050"/>
+          </a:solidFill>
+          <a:ln>
+            <a:noFill/>
+          </a:ln>
+          <a:effectLst>
+            <a:outerShdw blurRad="50760" dist="37674" dir="2700000" algn="tl" rotWithShape="0">
+              <a:srgbClr val="000000">
+                <a:alpha val="40000"/>
+              </a:srgbClr>
+            </a:outerShdw>
+          </a:effectLst>
+        </p:spPr>
+        <p:style>
+          <a:lnRef idx="2">
+            <a:schemeClr val="accent1">
+              <a:shade val="50000"/>
+            </a:schemeClr>
+          </a:lnRef>
+          <a:fillRef idx="1">
+            <a:schemeClr val="accent1"/>
+          </a:fillRef>
+          <a:effectRef idx="0">
+            <a:schemeClr val="accent1"/>
+          </a:effectRef>
+          <a:fontRef idx="minor"/>
+        </p:style>
+        <p:txBody>
+          <a:bodyPr lIns="56250" tIns="28125" rIns="56250" bIns="28125" anchor="ctr">
+            <a:noAutofit/>
+          </a:bodyPr>
+          <a:lstStyle/>
+          <a:p>
+            <a:pPr algn="ctr"/>
+            <a:r>
+              <a:rPr lang="en-US" sz="800" spc="-1">
+                <a:solidFill>
+                  <a:srgbClr val="000000"/>
+                </a:solidFill>
+                <a:latin typeface="Arial"/>
+              </a:rPr>
+              <a:t>IOLINK</a:t>
+            </a:r>
+            <a:endParaRPr lang="en-IN" sz="800" spc="-1" dirty="0">
+              <a:solidFill>
+                <a:srgbClr val="000000"/>
+              </a:solidFill>
+              <a:latin typeface="Arial"/>
+            </a:endParaRPr>
+          </a:p>
+        </p:txBody>
+      </p:sp>
+      <p:sp>
+        <p:nvSpPr>
+          <p:cNvPr id="126" name="CustomShape 13">
+            <a:extLst>
+              <a:ext uri="{FF2B5EF4-FFF2-40B4-BE49-F238E27FC236}">
+                <a16:creationId xmlns:a16="http://schemas.microsoft.com/office/drawing/2014/main" id="{7D442C8E-9CEC-424B-B472-19C40537AC37}"/>
+              </a:ext>
+            </a:extLst>
+          </p:cNvPr>
+          <p:cNvSpPr/>
+          <p:nvPr/>
+        </p:nvSpPr>
+        <p:spPr>
+          <a:xfrm>
+            <a:off x="4540797" y="1841166"/>
+            <a:ext cx="502610" cy="261225"/>
+          </a:xfrm>
+          <a:prstGeom prst="rect">
+            <a:avLst/>
+          </a:prstGeom>
+          <a:solidFill>
+            <a:srgbClr val="92D050"/>
+          </a:solidFill>
+          <a:ln>
+            <a:noFill/>
+          </a:ln>
+          <a:effectLst>
+            <a:outerShdw blurRad="50760" dist="37674" dir="2700000" algn="tl" rotWithShape="0">
+              <a:srgbClr val="000000">
+                <a:alpha val="40000"/>
+              </a:srgbClr>
+            </a:outerShdw>
+          </a:effectLst>
+        </p:spPr>
+        <p:style>
+          <a:lnRef idx="2">
+            <a:schemeClr val="accent1">
+              <a:shade val="50000"/>
+            </a:schemeClr>
+          </a:lnRef>
+          <a:fillRef idx="1">
+            <a:schemeClr val="accent1"/>
+          </a:fillRef>
+          <a:effectRef idx="0">
+            <a:schemeClr val="accent1"/>
+          </a:effectRef>
+          <a:fontRef idx="minor"/>
+        </p:style>
+        <p:txBody>
+          <a:bodyPr lIns="56250" tIns="28125" rIns="56250" bIns="28125" anchor="ctr">
+            <a:noAutofit/>
+          </a:bodyPr>
+          <a:lstStyle/>
+          <a:p>
+            <a:pPr algn="ctr"/>
+            <a:r>
+              <a:rPr lang="en-US" sz="800" spc="-1">
+                <a:solidFill>
+                  <a:srgbClr val="000000"/>
+                </a:solidFill>
+                <a:latin typeface="Arial"/>
+              </a:rPr>
+              <a:t>Profinet</a:t>
+            </a:r>
+            <a:endParaRPr lang="en-IN" sz="800" spc="-1" dirty="0">
+              <a:solidFill>
+                <a:srgbClr val="000000"/>
+              </a:solidFill>
+              <a:latin typeface="Arial"/>
+            </a:endParaRPr>
+          </a:p>
+        </p:txBody>
+      </p:sp>
+      <p:sp>
+        <p:nvSpPr>
+          <p:cNvPr id="128" name="CustomShape 13">
+            <a:extLst>
+              <a:ext uri="{FF2B5EF4-FFF2-40B4-BE49-F238E27FC236}">
+                <a16:creationId xmlns:a16="http://schemas.microsoft.com/office/drawing/2014/main" id="{76E2259F-8B4D-4A90-824C-BD1005B007ED}"/>
+              </a:ext>
+            </a:extLst>
+          </p:cNvPr>
+          <p:cNvSpPr/>
+          <p:nvPr/>
+        </p:nvSpPr>
+        <p:spPr>
+          <a:xfrm>
+            <a:off x="5123449" y="1844101"/>
+            <a:ext cx="956745" cy="261225"/>
+          </a:xfrm>
+          <a:prstGeom prst="rect">
+            <a:avLst/>
+          </a:prstGeom>
+          <a:solidFill>
+            <a:srgbClr val="92D050"/>
+          </a:solidFill>
+          <a:ln>
+            <a:noFill/>
+          </a:ln>
+          <a:effectLst>
+            <a:outerShdw blurRad="50760" dist="37674" dir="2700000" algn="tl" rotWithShape="0">
+              <a:srgbClr val="000000">
+                <a:alpha val="40000"/>
+              </a:srgbClr>
+            </a:outerShdw>
+          </a:effectLst>
+        </p:spPr>
+        <p:style>
+          <a:lnRef idx="2">
+            <a:schemeClr val="accent1">
+              <a:shade val="50000"/>
+            </a:schemeClr>
+          </a:lnRef>
+          <a:fillRef idx="1">
+            <a:schemeClr val="accent1"/>
+          </a:fillRef>
+          <a:effectRef idx="0">
+            <a:schemeClr val="accent1"/>
+          </a:effectRef>
+          <a:fontRef idx="minor"/>
+        </p:style>
+        <p:txBody>
+          <a:bodyPr lIns="56250" tIns="28125" rIns="56250" bIns="28125" anchor="ctr">
+            <a:noAutofit/>
+          </a:bodyPr>
+          <a:lstStyle/>
+          <a:p>
+            <a:pPr algn="ctr"/>
+            <a:r>
+              <a:rPr lang="en-US" sz="800" spc="-1" dirty="0" err="1">
+                <a:solidFill>
+                  <a:srgbClr val="000000"/>
+                </a:solidFill>
+                <a:latin typeface="Arial"/>
+              </a:rPr>
+              <a:t>EtherCAT</a:t>
+            </a:r>
+            <a:r>
+              <a:rPr lang="en-US" sz="800" spc="-1" dirty="0">
+                <a:solidFill>
+                  <a:srgbClr val="000000"/>
+                </a:solidFill>
+                <a:latin typeface="Arial"/>
+              </a:rPr>
+              <a:t> IOLINK Gateway</a:t>
+            </a:r>
+            <a:endParaRPr lang="en-IN" sz="800" spc="-1" dirty="0">
+              <a:solidFill>
+                <a:srgbClr val="000000"/>
+              </a:solidFill>
+              <a:latin typeface="Arial"/>
+            </a:endParaRPr>
+          </a:p>
+        </p:txBody>
+      </p:sp>
+      <p:sp>
+        <p:nvSpPr>
+          <p:cNvPr id="129" name="CustomShape 15">
+            <a:extLst>
+              <a:ext uri="{FF2B5EF4-FFF2-40B4-BE49-F238E27FC236}">
+                <a16:creationId xmlns:a16="http://schemas.microsoft.com/office/drawing/2014/main" id="{2EBBEBDF-9CEF-4F01-838B-ADAC24958989}"/>
+              </a:ext>
+            </a:extLst>
+          </p:cNvPr>
+          <p:cNvSpPr/>
+          <p:nvPr/>
+        </p:nvSpPr>
+        <p:spPr>
+          <a:xfrm>
+            <a:off x="4913845" y="2477660"/>
+            <a:ext cx="552801" cy="310587"/>
+          </a:xfrm>
+          <a:prstGeom prst="rect">
+            <a:avLst/>
+          </a:prstGeom>
+          <a:solidFill>
+            <a:srgbClr val="92D050"/>
+          </a:solidFill>
+          <a:ln>
+            <a:noFill/>
+          </a:ln>
+          <a:effectLst>
+            <a:outerShdw blurRad="50760" dist="37674" dir="2700000" algn="tl" rotWithShape="0">
+              <a:srgbClr val="000000">
+                <a:alpha val="40000"/>
+              </a:srgbClr>
+            </a:outerShdw>
+          </a:effectLst>
+        </p:spPr>
+        <p:style>
+          <a:lnRef idx="2">
+            <a:schemeClr val="accent1">
+              <a:shade val="50000"/>
+            </a:schemeClr>
+          </a:lnRef>
+          <a:fillRef idx="1">
+            <a:schemeClr val="accent1"/>
+          </a:fillRef>
+          <a:effectRef idx="0">
+            <a:schemeClr val="accent1"/>
+          </a:effectRef>
+          <a:fontRef idx="minor"/>
+        </p:style>
+        <p:txBody>
+          <a:bodyPr lIns="56250" tIns="28125" rIns="56250" bIns="28125" anchor="ctr">
+            <a:noAutofit/>
+          </a:bodyPr>
+          <a:lstStyle/>
+          <a:p>
+            <a:pPr algn="ctr"/>
+            <a:r>
+              <a:rPr lang="en-US" sz="800" spc="-1" dirty="0" err="1">
+                <a:solidFill>
+                  <a:srgbClr val="000000"/>
+                </a:solidFill>
+                <a:latin typeface="Arial"/>
+              </a:rPr>
+              <a:t>Profinet</a:t>
+            </a:r>
+            <a:endParaRPr lang="en-US" sz="800" spc="-1" dirty="0">
+              <a:solidFill>
+                <a:srgbClr val="000000"/>
+              </a:solidFill>
+              <a:latin typeface="Arial"/>
+            </a:endParaRPr>
+          </a:p>
+          <a:p>
+            <a:pPr algn="ctr"/>
+            <a:r>
+              <a:rPr lang="en-US" sz="800" spc="-1" dirty="0">
+                <a:solidFill>
+                  <a:srgbClr val="000000"/>
+                </a:solidFill>
+                <a:latin typeface="Arial"/>
+              </a:rPr>
+              <a:t>FW HAL</a:t>
+            </a:r>
+            <a:endParaRPr lang="en-IN" sz="800" spc="-1" dirty="0">
+              <a:solidFill>
+                <a:srgbClr val="000000"/>
+              </a:solidFill>
+              <a:latin typeface="Arial"/>
+            </a:endParaRPr>
+          </a:p>
+        </p:txBody>
+      </p:sp>
+      <p:sp>
+        <p:nvSpPr>
+          <p:cNvPr id="130" name="CustomShape 8">
+            <a:extLst>
+              <a:ext uri="{FF2B5EF4-FFF2-40B4-BE49-F238E27FC236}">
+                <a16:creationId xmlns:a16="http://schemas.microsoft.com/office/drawing/2014/main" id="{002ED6A7-143E-4519-97EF-48B3D166EC5C}"/>
+              </a:ext>
+            </a:extLst>
+          </p:cNvPr>
+          <p:cNvSpPr/>
+          <p:nvPr/>
+        </p:nvSpPr>
+        <p:spPr>
+          <a:xfrm>
+            <a:off x="4333137" y="1136468"/>
+            <a:ext cx="893130" cy="281025"/>
+          </a:xfrm>
+          <a:prstGeom prst="rect">
+            <a:avLst/>
+          </a:prstGeom>
+          <a:solidFill>
+            <a:srgbClr val="92D050"/>
+          </a:solidFill>
+          <a:ln>
+            <a:noFill/>
+          </a:ln>
+          <a:effectLst>
+            <a:outerShdw blurRad="50760" dist="37674" dir="2700000" algn="tl" rotWithShape="0">
+              <a:srgbClr val="000000">
+                <a:alpha val="40000"/>
+              </a:srgbClr>
+            </a:outerShdw>
+          </a:effectLst>
+        </p:spPr>
+        <p:style>
+          <a:lnRef idx="2">
+            <a:schemeClr val="accent1">
+              <a:shade val="50000"/>
+            </a:schemeClr>
+          </a:lnRef>
+          <a:fillRef idx="1">
+            <a:schemeClr val="accent1"/>
+          </a:fillRef>
+          <a:effectRef idx="0">
+            <a:schemeClr val="accent1"/>
+          </a:effectRef>
+          <a:fontRef idx="minor"/>
+        </p:style>
+        <p:txBody>
+          <a:bodyPr lIns="56250" tIns="28125" rIns="56250" bIns="28125" anchor="ctr">
+            <a:noAutofit/>
+          </a:bodyPr>
+          <a:lstStyle/>
+          <a:p>
+            <a:pPr algn="ctr"/>
+            <a:r>
+              <a:rPr lang="en-US" sz="800" spc="-1" dirty="0" err="1">
+                <a:solidFill>
+                  <a:srgbClr val="000000"/>
+                </a:solidFill>
+              </a:rPr>
+              <a:t>EtherCAT</a:t>
+            </a:r>
+            <a:r>
+              <a:rPr lang="en-US" sz="800" spc="-1" dirty="0">
+                <a:solidFill>
+                  <a:srgbClr val="000000"/>
+                </a:solidFill>
+              </a:rPr>
+              <a:t> IOLINK Gateway</a:t>
+            </a:r>
+            <a:endParaRPr lang="en-IN" sz="800" spc="-1" dirty="0">
+              <a:solidFill>
+                <a:srgbClr val="000000"/>
+              </a:solidFill>
+            </a:endParaRPr>
+          </a:p>
+        </p:txBody>
+      </p:sp>
+      <p:sp>
+        <p:nvSpPr>
+          <p:cNvPr id="135" name="CustomShape 24">
+            <a:extLst>
+              <a:ext uri="{FF2B5EF4-FFF2-40B4-BE49-F238E27FC236}">
+                <a16:creationId xmlns:a16="http://schemas.microsoft.com/office/drawing/2014/main" id="{1B94C8AB-5DBE-4042-BBD6-4983A154422B}"/>
+              </a:ext>
+            </a:extLst>
+          </p:cNvPr>
+          <p:cNvSpPr/>
+          <p:nvPr/>
+        </p:nvSpPr>
+        <p:spPr>
+          <a:xfrm>
+            <a:off x="5403107" y="1140715"/>
+            <a:ext cx="677087" cy="281025"/>
+          </a:xfrm>
+          <a:prstGeom prst="rect">
+            <a:avLst/>
+          </a:prstGeom>
+          <a:solidFill>
+            <a:srgbClr val="92D050"/>
+          </a:solidFill>
+          <a:ln>
+            <a:noFill/>
+          </a:ln>
+          <a:effectLst>
+            <a:outerShdw blurRad="50760" dist="37674" dir="2700000" algn="tl" rotWithShape="0">
+              <a:srgbClr val="000000">
+                <a:alpha val="40000"/>
+              </a:srgbClr>
+            </a:outerShdw>
+          </a:effectLst>
+        </p:spPr>
+        <p:style>
+          <a:lnRef idx="2">
+            <a:schemeClr val="accent1">
+              <a:shade val="50000"/>
+            </a:schemeClr>
+          </a:lnRef>
+          <a:fillRef idx="1">
+            <a:schemeClr val="accent1"/>
+          </a:fillRef>
+          <a:effectRef idx="0">
+            <a:schemeClr val="accent1"/>
+          </a:effectRef>
+          <a:fontRef idx="minor"/>
+        </p:style>
+        <p:txBody>
+          <a:bodyPr lIns="56250" tIns="28125" rIns="56250" bIns="28125" anchor="ctr">
+            <a:noAutofit/>
+          </a:bodyPr>
+          <a:lstStyle/>
+          <a:p>
+            <a:pPr algn="ctr"/>
+            <a:r>
+              <a:rPr lang="en-US" sz="800" spc="-1" dirty="0">
+                <a:solidFill>
+                  <a:srgbClr val="000000"/>
+                </a:solidFill>
+                <a:latin typeface="Arial"/>
+              </a:rPr>
+              <a:t>HSR/PRP</a:t>
+            </a:r>
+            <a:endParaRPr lang="en-IN" sz="800" spc="-1" dirty="0">
+              <a:solidFill>
+                <a:srgbClr val="000000"/>
+              </a:solidFill>
+              <a:latin typeface="Arial"/>
+            </a:endParaRPr>
+          </a:p>
+        </p:txBody>
+      </p:sp>
+      <p:sp>
+        <p:nvSpPr>
+          <p:cNvPr id="137" name="CustomShape 7">
+            <a:extLst>
+              <a:ext uri="{FF2B5EF4-FFF2-40B4-BE49-F238E27FC236}">
+                <a16:creationId xmlns:a16="http://schemas.microsoft.com/office/drawing/2014/main" id="{63348C38-19BF-49D5-8C54-18BEAF892E69}"/>
+              </a:ext>
+            </a:extLst>
+          </p:cNvPr>
+          <p:cNvSpPr/>
+          <p:nvPr/>
+        </p:nvSpPr>
+        <p:spPr>
+          <a:xfrm>
+            <a:off x="2634423" y="4173098"/>
+            <a:ext cx="1114010" cy="335592"/>
+          </a:xfrm>
+          <a:prstGeom prst="rect">
+            <a:avLst/>
+          </a:prstGeom>
+          <a:solidFill>
+            <a:schemeClr val="bg2"/>
+          </a:solidFill>
+          <a:ln>
+            <a:noFill/>
+          </a:ln>
+          <a:effectLst>
+            <a:outerShdw blurRad="50760" dist="37674" dir="2700000" algn="tl" rotWithShape="0">
+              <a:srgbClr val="000000">
+                <a:alpha val="40000"/>
+              </a:srgbClr>
+            </a:outerShdw>
+          </a:effectLst>
+        </p:spPr>
+        <p:style>
+          <a:lnRef idx="2">
+            <a:schemeClr val="accent1">
+              <a:shade val="50000"/>
+            </a:schemeClr>
+          </a:lnRef>
+          <a:fillRef idx="1">
+            <a:schemeClr val="accent1"/>
+          </a:fillRef>
+          <a:effectRef idx="0">
+            <a:schemeClr val="accent1"/>
+          </a:effectRef>
+          <a:fontRef idx="minor"/>
+        </p:style>
+        <p:txBody>
+          <a:bodyPr lIns="56250" tIns="28125" rIns="56250" bIns="28125" anchor="ctr">
+            <a:noAutofit/>
+          </a:bodyPr>
+          <a:lstStyle/>
+          <a:p>
+            <a:pPr algn="ctr">
+              <a:lnSpc>
+                <a:spcPct val="100000"/>
+              </a:lnSpc>
+              <a:buNone/>
+            </a:pPr>
+            <a:r>
+              <a:rPr lang="en-US" sz="1000" spc="-1" dirty="0">
+                <a:solidFill>
+                  <a:srgbClr val="FFFFFF"/>
+                </a:solidFill>
+                <a:latin typeface="Arial"/>
+                <a:ea typeface="DejaVu Sans"/>
+              </a:rPr>
+              <a:t>MCU + SDK </a:t>
+            </a:r>
+            <a:endParaRPr lang="en-IN" sz="1000" spc="-1" dirty="0">
+              <a:latin typeface="Arial"/>
+            </a:endParaRPr>
+          </a:p>
+        </p:txBody>
+      </p:sp>
+      <p:sp>
+        <p:nvSpPr>
+          <p:cNvPr id="138" name="CustomShape 15">
+            <a:extLst>
+              <a:ext uri="{FF2B5EF4-FFF2-40B4-BE49-F238E27FC236}">
+                <a16:creationId xmlns:a16="http://schemas.microsoft.com/office/drawing/2014/main" id="{88907D93-095F-44B5-98AB-8FC3C08A34E4}"/>
+              </a:ext>
+            </a:extLst>
+          </p:cNvPr>
+          <p:cNvSpPr/>
+          <p:nvPr/>
+        </p:nvSpPr>
+        <p:spPr>
+          <a:xfrm>
+            <a:off x="3912370" y="4173098"/>
+            <a:ext cx="1114010" cy="335592"/>
+          </a:xfrm>
+          <a:prstGeom prst="rect">
+            <a:avLst/>
+          </a:prstGeom>
+          <a:solidFill>
+            <a:srgbClr val="92D050"/>
+          </a:solidFill>
+          <a:ln>
+            <a:noFill/>
+          </a:ln>
+          <a:effectLst>
+            <a:outerShdw blurRad="50760" dist="37674" dir="2700000" algn="tl" rotWithShape="0">
+              <a:srgbClr val="000000">
+                <a:alpha val="40000"/>
+              </a:srgbClr>
+            </a:outerShdw>
+          </a:effectLst>
+        </p:spPr>
+        <p:style>
+          <a:lnRef idx="2">
+            <a:schemeClr val="accent1">
+              <a:shade val="50000"/>
+            </a:schemeClr>
+          </a:lnRef>
+          <a:fillRef idx="1">
+            <a:schemeClr val="accent1"/>
+          </a:fillRef>
+          <a:effectRef idx="0">
+            <a:schemeClr val="accent1"/>
+          </a:effectRef>
+          <a:fontRef idx="minor"/>
+        </p:style>
+        <p:txBody>
+          <a:bodyPr lIns="56250" tIns="28125" rIns="56250" bIns="28125" anchor="ctr">
+            <a:noAutofit/>
+          </a:bodyPr>
+          <a:lstStyle/>
+          <a:p>
+            <a:pPr algn="ctr"/>
+            <a:r>
+              <a:rPr lang="en-IN" sz="800" spc="-1" dirty="0">
+                <a:solidFill>
+                  <a:srgbClr val="000000"/>
+                </a:solidFill>
+                <a:latin typeface="Arial"/>
+              </a:rPr>
+              <a:t>Industrial Communications SDK</a:t>
+            </a:r>
+          </a:p>
+        </p:txBody>
+      </p:sp>
+      <p:sp>
+        <p:nvSpPr>
+          <p:cNvPr id="47" name="CustomShape 17">
+            <a:extLst>
+              <a:ext uri="{FF2B5EF4-FFF2-40B4-BE49-F238E27FC236}">
+                <a16:creationId xmlns:a16="http://schemas.microsoft.com/office/drawing/2014/main" id="{4291FF05-F6CE-4A38-84EE-58927DBC4826}"/>
+              </a:ext>
+            </a:extLst>
+          </p:cNvPr>
+          <p:cNvSpPr/>
+          <p:nvPr/>
+        </p:nvSpPr>
+        <p:spPr>
+          <a:xfrm>
+            <a:off x="6245444" y="964408"/>
+            <a:ext cx="877730" cy="2678234"/>
+          </a:xfrm>
+          <a:prstGeom prst="rect">
+            <a:avLst/>
+          </a:prstGeom>
+          <a:noFill/>
+          <a:ln>
+            <a:solidFill>
+              <a:srgbClr val="000000"/>
+            </a:solidFill>
+            <a:round/>
+          </a:ln>
+        </p:spPr>
+        <p:style>
+          <a:lnRef idx="2">
+            <a:schemeClr val="accent1">
+              <a:shade val="50000"/>
+            </a:schemeClr>
+          </a:lnRef>
+          <a:fillRef idx="1">
+            <a:schemeClr val="accent1"/>
+          </a:fillRef>
+          <a:effectRef idx="0">
+            <a:schemeClr val="accent1"/>
+          </a:effectRef>
+          <a:fontRef idx="minor"/>
+        </p:style>
+        <p:txBody>
+          <a:bodyPr lIns="56250" tIns="28125" rIns="56250" bIns="28125" anchor="t">
+            <a:noAutofit/>
+          </a:bodyPr>
+          <a:lstStyle/>
+          <a:p>
+            <a:pPr algn="ctr">
+              <a:lnSpc>
+                <a:spcPct val="100000"/>
+              </a:lnSpc>
+              <a:buNone/>
+            </a:pPr>
+            <a:r>
+              <a:rPr lang="en-US" sz="1125" spc="-1" dirty="0">
+                <a:solidFill>
+                  <a:srgbClr val="000000"/>
+                </a:solidFill>
+                <a:latin typeface="Arial"/>
+              </a:rPr>
+              <a:t>Firmware</a:t>
+            </a:r>
+            <a:endParaRPr lang="en-IN" sz="1125" spc="-1" dirty="0">
+              <a:latin typeface="Arial"/>
+            </a:endParaRPr>
+          </a:p>
+        </p:txBody>
+      </p:sp>
+      <p:sp>
+        <p:nvSpPr>
+          <p:cNvPr id="52" name="CustomShape 23">
+            <a:extLst>
+              <a:ext uri="{FF2B5EF4-FFF2-40B4-BE49-F238E27FC236}">
+                <a16:creationId xmlns:a16="http://schemas.microsoft.com/office/drawing/2014/main" id="{7BCD0863-F6ED-4DC4-983E-37943352EE5E}"/>
+              </a:ext>
+            </a:extLst>
+          </p:cNvPr>
+          <p:cNvSpPr/>
+          <p:nvPr/>
+        </p:nvSpPr>
+        <p:spPr>
+          <a:xfrm>
+            <a:off x="6245444" y="3702942"/>
+            <a:ext cx="877730" cy="327717"/>
+          </a:xfrm>
+          <a:prstGeom prst="rect">
+            <a:avLst/>
+          </a:prstGeom>
+          <a:solidFill>
+            <a:schemeClr val="tx1"/>
+          </a:solidFill>
+          <a:ln>
+            <a:noFill/>
+          </a:ln>
+        </p:spPr>
+        <p:style>
+          <a:lnRef idx="2">
+            <a:schemeClr val="accent1">
+              <a:shade val="50000"/>
+            </a:schemeClr>
+          </a:lnRef>
+          <a:fillRef idx="1">
+            <a:schemeClr val="accent1"/>
+          </a:fillRef>
+          <a:effectRef idx="0">
+            <a:schemeClr val="accent1"/>
+          </a:effectRef>
+          <a:fontRef idx="minor"/>
+        </p:style>
+        <p:txBody>
+          <a:bodyPr lIns="56250" tIns="28125" rIns="56250" bIns="28125" anchor="ctr">
+            <a:noAutofit/>
+          </a:bodyPr>
+          <a:lstStyle/>
+          <a:p>
+            <a:pPr algn="ctr">
+              <a:lnSpc>
+                <a:spcPct val="100000"/>
+              </a:lnSpc>
+              <a:buNone/>
+            </a:pPr>
+            <a:r>
+              <a:rPr lang="en-US" sz="1000" spc="-1" dirty="0">
+                <a:solidFill>
+                  <a:srgbClr val="FFFFFF"/>
+                </a:solidFill>
+                <a:latin typeface="Arial"/>
+                <a:ea typeface="DejaVu Sans"/>
+              </a:rPr>
+              <a:t>ICSS</a:t>
+            </a:r>
+            <a:endParaRPr lang="en-IN" sz="1000" spc="-1" dirty="0">
+              <a:latin typeface="Arial"/>
+            </a:endParaRPr>
+          </a:p>
+        </p:txBody>
+      </p:sp>
+      <p:sp>
+        <p:nvSpPr>
+          <p:cNvPr id="54" name="CustomShape 8">
+            <a:extLst>
+              <a:ext uri="{FF2B5EF4-FFF2-40B4-BE49-F238E27FC236}">
+                <a16:creationId xmlns:a16="http://schemas.microsoft.com/office/drawing/2014/main" id="{12F95B4D-3759-4104-8D58-EAF6518E9F95}"/>
+              </a:ext>
+            </a:extLst>
+          </p:cNvPr>
+          <p:cNvSpPr/>
+          <p:nvPr/>
+        </p:nvSpPr>
+        <p:spPr>
+          <a:xfrm>
+            <a:off x="6335665" y="1220980"/>
+            <a:ext cx="696511" cy="281025"/>
+          </a:xfrm>
+          <a:prstGeom prst="rect">
+            <a:avLst/>
+          </a:prstGeom>
+          <a:solidFill>
+            <a:srgbClr val="92D050"/>
+          </a:solidFill>
+          <a:ln>
+            <a:noFill/>
+          </a:ln>
+          <a:effectLst>
+            <a:outerShdw blurRad="50760" dist="37674" dir="2700000" algn="tl" rotWithShape="0">
+              <a:srgbClr val="000000">
+                <a:alpha val="40000"/>
+              </a:srgbClr>
+            </a:outerShdw>
+          </a:effectLst>
+        </p:spPr>
+        <p:style>
+          <a:lnRef idx="2">
+            <a:schemeClr val="accent1">
+              <a:shade val="50000"/>
+            </a:schemeClr>
+          </a:lnRef>
+          <a:fillRef idx="1">
+            <a:schemeClr val="accent1"/>
+          </a:fillRef>
+          <a:effectRef idx="0">
+            <a:schemeClr val="accent1"/>
+          </a:effectRef>
+          <a:fontRef idx="minor"/>
+        </p:style>
+        <p:txBody>
+          <a:bodyPr lIns="56250" tIns="28125" rIns="56250" bIns="28125" anchor="ctr">
+            <a:noAutofit/>
+          </a:bodyPr>
+          <a:lstStyle/>
+          <a:p>
+            <a:pPr algn="ctr"/>
+            <a:r>
+              <a:rPr lang="en-US" sz="800" spc="-1" dirty="0" err="1">
+                <a:solidFill>
+                  <a:srgbClr val="000000"/>
+                </a:solidFill>
+                <a:latin typeface="Arial"/>
+              </a:rPr>
+              <a:t>EtherNet</a:t>
+            </a:r>
+            <a:r>
+              <a:rPr lang="en-US" sz="800" spc="-1">
+                <a:solidFill>
+                  <a:srgbClr val="000000"/>
+                </a:solidFill>
+                <a:latin typeface="Arial"/>
+              </a:rPr>
+              <a:t>/IP</a:t>
+            </a:r>
+            <a:endParaRPr lang="en-IN" sz="800" spc="-1" dirty="0">
+              <a:solidFill>
+                <a:srgbClr val="000000"/>
+              </a:solidFill>
+              <a:latin typeface="Arial"/>
+            </a:endParaRPr>
+          </a:p>
+        </p:txBody>
+      </p:sp>
+      <p:sp>
+        <p:nvSpPr>
+          <p:cNvPr id="55" name="CustomShape 8">
+            <a:extLst>
+              <a:ext uri="{FF2B5EF4-FFF2-40B4-BE49-F238E27FC236}">
+                <a16:creationId xmlns:a16="http://schemas.microsoft.com/office/drawing/2014/main" id="{D3B83D30-7279-4106-8E40-EC7C6D8CAA48}"/>
+              </a:ext>
+            </a:extLst>
+          </p:cNvPr>
+          <p:cNvSpPr/>
+          <p:nvPr/>
+        </p:nvSpPr>
+        <p:spPr>
+          <a:xfrm>
+            <a:off x="6335666" y="1702576"/>
+            <a:ext cx="696511" cy="281025"/>
+          </a:xfrm>
+          <a:prstGeom prst="rect">
+            <a:avLst/>
+          </a:prstGeom>
+          <a:solidFill>
+            <a:srgbClr val="92D050"/>
+          </a:solidFill>
+          <a:ln>
+            <a:noFill/>
+          </a:ln>
+          <a:effectLst>
+            <a:outerShdw blurRad="50760" dist="37674" dir="2700000" algn="tl" rotWithShape="0">
+              <a:srgbClr val="000000">
+                <a:alpha val="40000"/>
+              </a:srgbClr>
+            </a:outerShdw>
+          </a:effectLst>
+        </p:spPr>
+        <p:style>
+          <a:lnRef idx="2">
+            <a:schemeClr val="accent1">
+              <a:shade val="50000"/>
+            </a:schemeClr>
+          </a:lnRef>
+          <a:fillRef idx="1">
+            <a:schemeClr val="accent1"/>
+          </a:fillRef>
+          <a:effectRef idx="0">
+            <a:schemeClr val="accent1"/>
+          </a:effectRef>
+          <a:fontRef idx="minor"/>
+        </p:style>
+        <p:txBody>
+          <a:bodyPr lIns="56250" tIns="28125" rIns="56250" bIns="28125" anchor="ctr">
+            <a:noAutofit/>
+          </a:bodyPr>
+          <a:lstStyle/>
+          <a:p>
+            <a:pPr algn="ctr"/>
+            <a:r>
+              <a:rPr lang="en-US" sz="800" spc="-1">
+                <a:solidFill>
+                  <a:srgbClr val="000000"/>
+                </a:solidFill>
+                <a:latin typeface="Arial"/>
+              </a:rPr>
+              <a:t>EtherCAT</a:t>
+            </a:r>
+            <a:endParaRPr lang="en-IN" sz="800" spc="-1" dirty="0">
+              <a:solidFill>
+                <a:srgbClr val="000000"/>
+              </a:solidFill>
+              <a:latin typeface="Arial"/>
+            </a:endParaRPr>
+          </a:p>
+        </p:txBody>
+      </p:sp>
+      <p:sp>
+        <p:nvSpPr>
+          <p:cNvPr id="56" name="CustomShape 8">
+            <a:extLst>
+              <a:ext uri="{FF2B5EF4-FFF2-40B4-BE49-F238E27FC236}">
+                <a16:creationId xmlns:a16="http://schemas.microsoft.com/office/drawing/2014/main" id="{F066D251-BD10-4F66-97F8-912DA5134E01}"/>
+              </a:ext>
+            </a:extLst>
+          </p:cNvPr>
+          <p:cNvSpPr/>
+          <p:nvPr/>
+        </p:nvSpPr>
+        <p:spPr>
+          <a:xfrm>
+            <a:off x="6343553" y="2182727"/>
+            <a:ext cx="696511" cy="281025"/>
+          </a:xfrm>
+          <a:prstGeom prst="rect">
+            <a:avLst/>
+          </a:prstGeom>
+          <a:solidFill>
+            <a:srgbClr val="92D050"/>
+          </a:solidFill>
+          <a:ln>
+            <a:noFill/>
+          </a:ln>
+          <a:effectLst>
+            <a:outerShdw blurRad="50760" dist="37674" dir="2700000" algn="tl" rotWithShape="0">
+              <a:srgbClr val="000000">
+                <a:alpha val="40000"/>
+              </a:srgbClr>
+            </a:outerShdw>
+          </a:effectLst>
+        </p:spPr>
+        <p:style>
+          <a:lnRef idx="2">
+            <a:schemeClr val="accent1">
+              <a:shade val="50000"/>
+            </a:schemeClr>
+          </a:lnRef>
+          <a:fillRef idx="1">
+            <a:schemeClr val="accent1"/>
+          </a:fillRef>
+          <a:effectRef idx="0">
+            <a:schemeClr val="accent1"/>
+          </a:effectRef>
+          <a:fontRef idx="minor"/>
+        </p:style>
+        <p:txBody>
+          <a:bodyPr lIns="56250" tIns="28125" rIns="56250" bIns="28125" anchor="ctr">
+            <a:noAutofit/>
+          </a:bodyPr>
+          <a:lstStyle/>
+          <a:p>
+            <a:pPr algn="ctr"/>
+            <a:r>
+              <a:rPr lang="en-IN" sz="800" spc="-1">
+                <a:solidFill>
+                  <a:srgbClr val="000000"/>
+                </a:solidFill>
+                <a:latin typeface="Arial"/>
+              </a:rPr>
+              <a:t>Profinet</a:t>
+            </a:r>
+            <a:endParaRPr lang="en-IN" sz="800" spc="-1" dirty="0">
+              <a:solidFill>
+                <a:srgbClr val="000000"/>
+              </a:solidFill>
+              <a:latin typeface="Arial"/>
+            </a:endParaRPr>
+          </a:p>
+        </p:txBody>
+      </p:sp>
+      <p:sp>
+        <p:nvSpPr>
+          <p:cNvPr id="57" name="CustomShape 8">
+            <a:extLst>
+              <a:ext uri="{FF2B5EF4-FFF2-40B4-BE49-F238E27FC236}">
+                <a16:creationId xmlns:a16="http://schemas.microsoft.com/office/drawing/2014/main" id="{88B97E17-05DC-49D0-B861-F3FA96A2799E}"/>
+              </a:ext>
+            </a:extLst>
+          </p:cNvPr>
+          <p:cNvSpPr/>
+          <p:nvPr/>
+        </p:nvSpPr>
+        <p:spPr>
+          <a:xfrm>
+            <a:off x="6335667" y="2662878"/>
+            <a:ext cx="696511" cy="281025"/>
+          </a:xfrm>
+          <a:prstGeom prst="rect">
+            <a:avLst/>
+          </a:prstGeom>
+          <a:solidFill>
+            <a:srgbClr val="92D050"/>
+          </a:solidFill>
+          <a:ln>
+            <a:noFill/>
+          </a:ln>
+          <a:effectLst>
+            <a:outerShdw blurRad="50760" dist="37674" dir="2700000" algn="tl" rotWithShape="0">
+              <a:srgbClr val="000000">
+                <a:alpha val="40000"/>
+              </a:srgbClr>
+            </a:outerShdw>
+          </a:effectLst>
+        </p:spPr>
+        <p:style>
+          <a:lnRef idx="2">
+            <a:schemeClr val="accent1">
+              <a:shade val="50000"/>
+            </a:schemeClr>
+          </a:lnRef>
+          <a:fillRef idx="1">
+            <a:schemeClr val="accent1"/>
+          </a:fillRef>
+          <a:effectRef idx="0">
+            <a:schemeClr val="accent1"/>
+          </a:effectRef>
+          <a:fontRef idx="minor"/>
+        </p:style>
+        <p:txBody>
+          <a:bodyPr lIns="56250" tIns="28125" rIns="56250" bIns="28125" anchor="ctr">
+            <a:noAutofit/>
+          </a:bodyPr>
+          <a:lstStyle/>
+          <a:p>
+            <a:pPr algn="ctr"/>
+            <a:r>
+              <a:rPr lang="en-IN" sz="800" spc="-1" dirty="0">
+                <a:solidFill>
+                  <a:srgbClr val="000000"/>
+                </a:solidFill>
+                <a:latin typeface="Arial"/>
+              </a:rPr>
+              <a:t>HSR</a:t>
+            </a:r>
+            <a:r>
+              <a:rPr lang="en-IN" sz="800" spc="-1">
+                <a:solidFill>
+                  <a:srgbClr val="000000"/>
+                </a:solidFill>
+                <a:latin typeface="Arial"/>
+              </a:rPr>
+              <a:t>/PRP</a:t>
+            </a:r>
+            <a:endParaRPr lang="en-IN" sz="800" spc="-1" dirty="0">
+              <a:solidFill>
+                <a:srgbClr val="000000"/>
+              </a:solidFill>
+              <a:latin typeface="Arial"/>
+            </a:endParaRPr>
+          </a:p>
+        </p:txBody>
+      </p:sp>
+      <p:sp>
+        <p:nvSpPr>
+          <p:cNvPr id="58" name="CustomShape 8">
+            <a:extLst>
+              <a:ext uri="{FF2B5EF4-FFF2-40B4-BE49-F238E27FC236}">
+                <a16:creationId xmlns:a16="http://schemas.microsoft.com/office/drawing/2014/main" id="{9B88924C-E2C0-4454-9570-B8AE32A9838D}"/>
+              </a:ext>
+            </a:extLst>
+          </p:cNvPr>
+          <p:cNvSpPr/>
+          <p:nvPr/>
+        </p:nvSpPr>
+        <p:spPr>
+          <a:xfrm>
+            <a:off x="6343554" y="3143029"/>
+            <a:ext cx="696511" cy="281025"/>
+          </a:xfrm>
+          <a:prstGeom prst="rect">
+            <a:avLst/>
+          </a:prstGeom>
+          <a:solidFill>
+            <a:srgbClr val="92D050"/>
+          </a:solidFill>
+          <a:ln>
+            <a:noFill/>
+          </a:ln>
+          <a:effectLst>
+            <a:outerShdw blurRad="50760" dist="37674" dir="2700000" algn="tl" rotWithShape="0">
+              <a:srgbClr val="000000">
+                <a:alpha val="40000"/>
+              </a:srgbClr>
+            </a:outerShdw>
+          </a:effectLst>
+        </p:spPr>
+        <p:style>
+          <a:lnRef idx="2">
+            <a:schemeClr val="accent1">
+              <a:shade val="50000"/>
+            </a:schemeClr>
+          </a:lnRef>
+          <a:fillRef idx="1">
+            <a:schemeClr val="accent1"/>
+          </a:fillRef>
+          <a:effectRef idx="0">
+            <a:schemeClr val="accent1"/>
+          </a:effectRef>
+          <a:fontRef idx="minor"/>
+        </p:style>
+        <p:txBody>
+          <a:bodyPr lIns="56250" tIns="28125" rIns="56250" bIns="28125" anchor="ctr">
+            <a:noAutofit/>
+          </a:bodyPr>
+          <a:lstStyle/>
+          <a:p>
+            <a:pPr algn="ctr"/>
+            <a:r>
+              <a:rPr lang="en-IN" sz="800" spc="-1" dirty="0">
+                <a:solidFill>
+                  <a:srgbClr val="000000"/>
+                </a:solidFill>
+                <a:latin typeface="Arial"/>
+              </a:rPr>
+              <a:t>ENET MAC/Switch</a:t>
+            </a:r>
+          </a:p>
+        </p:txBody>
+      </p:sp>
+      <p:sp>
+        <p:nvSpPr>
+          <p:cNvPr id="53" name="CustomShape 4">
+            <a:extLst>
+              <a:ext uri="{FF2B5EF4-FFF2-40B4-BE49-F238E27FC236}">
+                <a16:creationId xmlns:a16="http://schemas.microsoft.com/office/drawing/2014/main" id="{97D896C7-D779-43E3-8EEB-18709C07EF68}"/>
+              </a:ext>
+            </a:extLst>
+          </p:cNvPr>
+          <p:cNvSpPr/>
+          <p:nvPr/>
+        </p:nvSpPr>
+        <p:spPr>
+          <a:xfrm>
+            <a:off x="3147633" y="2481061"/>
+            <a:ext cx="476185" cy="314308"/>
+          </a:xfrm>
+          <a:prstGeom prst="rect">
+            <a:avLst/>
+          </a:prstGeom>
+          <a:solidFill>
+            <a:srgbClr val="92D050"/>
+          </a:solidFill>
+          <a:ln>
+            <a:noFill/>
+          </a:ln>
+          <a:effectLst>
+            <a:outerShdw blurRad="50760" dist="37674" dir="2700000" algn="tl" rotWithShape="0">
+              <a:srgbClr val="000000">
+                <a:alpha val="40000"/>
+              </a:srgbClr>
+            </a:outerShdw>
+          </a:effectLst>
+        </p:spPr>
+        <p:style>
+          <a:lnRef idx="2">
+            <a:schemeClr val="accent1">
+              <a:shade val="50000"/>
+            </a:schemeClr>
+          </a:lnRef>
+          <a:fillRef idx="1">
+            <a:schemeClr val="accent1"/>
+          </a:fillRef>
+          <a:effectRef idx="0">
+            <a:schemeClr val="accent1"/>
+          </a:effectRef>
+          <a:fontRef idx="minor"/>
+        </p:style>
+        <p:txBody>
+          <a:bodyPr lIns="56250" tIns="28125" rIns="56250" bIns="28125" anchor="ctr">
+            <a:noAutofit/>
+          </a:bodyPr>
+          <a:lstStyle/>
+          <a:p>
+            <a:pPr algn="ctr"/>
+            <a:r>
+              <a:rPr lang="en-US" sz="800" spc="-1" dirty="0">
+                <a:latin typeface="Arial"/>
+              </a:rPr>
+              <a:t>ICSS EMAC</a:t>
+            </a:r>
+            <a:endParaRPr lang="en-IN" sz="800" spc="-1" dirty="0">
+              <a:latin typeface="Arial"/>
+            </a:endParaRPr>
+          </a:p>
+        </p:txBody>
+      </p:sp>
+      <p:sp>
+        <p:nvSpPr>
+          <p:cNvPr id="60" name="CustomShape 8">
+            <a:extLst>
+              <a:ext uri="{FF2B5EF4-FFF2-40B4-BE49-F238E27FC236}">
+                <a16:creationId xmlns:a16="http://schemas.microsoft.com/office/drawing/2014/main" id="{AFCA26DE-C2C0-4726-B3B8-382C307C9245}"/>
+              </a:ext>
+            </a:extLst>
+          </p:cNvPr>
+          <p:cNvSpPr/>
+          <p:nvPr/>
+        </p:nvSpPr>
+        <p:spPr>
+          <a:xfrm>
+            <a:off x="3727323" y="1140715"/>
+            <a:ext cx="501076" cy="281025"/>
+          </a:xfrm>
+          <a:prstGeom prst="rect">
+            <a:avLst/>
+          </a:prstGeom>
+          <a:solidFill>
+            <a:srgbClr val="92D050"/>
+          </a:solidFill>
+          <a:ln>
+            <a:noFill/>
+          </a:ln>
+          <a:effectLst>
+            <a:outerShdw blurRad="50760" dist="37674" dir="2700000" algn="tl" rotWithShape="0">
+              <a:srgbClr val="000000">
+                <a:alpha val="40000"/>
+              </a:srgbClr>
+            </a:outerShdw>
+          </a:effectLst>
+        </p:spPr>
+        <p:style>
+          <a:lnRef idx="2">
+            <a:schemeClr val="accent1">
+              <a:shade val="50000"/>
+            </a:schemeClr>
+          </a:lnRef>
+          <a:fillRef idx="1">
+            <a:schemeClr val="accent1"/>
+          </a:fillRef>
+          <a:effectRef idx="0">
+            <a:schemeClr val="accent1"/>
+          </a:effectRef>
+          <a:fontRef idx="minor"/>
+        </p:style>
+        <p:txBody>
+          <a:bodyPr lIns="56250" tIns="28125" rIns="56250" bIns="28125" anchor="ctr">
+            <a:noAutofit/>
+          </a:bodyPr>
+          <a:lstStyle/>
+          <a:p>
+            <a:pPr algn="ctr"/>
+            <a:r>
+              <a:rPr lang="en-US" sz="800" spc="-1" dirty="0">
+                <a:solidFill>
+                  <a:srgbClr val="000000"/>
+                </a:solidFill>
+              </a:rPr>
+              <a:t>IOLINK</a:t>
+            </a:r>
+            <a:endParaRPr lang="en-IN" sz="800" spc="-1" dirty="0">
+              <a:solidFill>
+                <a:srgbClr val="000000"/>
+              </a:solidFill>
+              <a:latin typeface="Arial"/>
+            </a:endParaRPr>
+          </a:p>
+        </p:txBody>
+      </p:sp>
+      <p:sp>
+        <p:nvSpPr>
+          <p:cNvPr id="59" name="CustomShape 15">
+            <a:extLst>
+              <a:ext uri="{FF2B5EF4-FFF2-40B4-BE49-F238E27FC236}">
+                <a16:creationId xmlns:a16="http://schemas.microsoft.com/office/drawing/2014/main" id="{27C412CF-A645-442A-A325-31275374C607}"/>
+              </a:ext>
+            </a:extLst>
+          </p:cNvPr>
+          <p:cNvSpPr/>
+          <p:nvPr/>
+        </p:nvSpPr>
+        <p:spPr>
+          <a:xfrm>
+            <a:off x="2628525" y="2479540"/>
+            <a:ext cx="498200" cy="313537"/>
+          </a:xfrm>
+          <a:prstGeom prst="rect">
+            <a:avLst/>
+          </a:prstGeom>
+          <a:solidFill>
+            <a:schemeClr val="bg2"/>
+          </a:solidFill>
+          <a:ln>
+            <a:noFill/>
+          </a:ln>
+          <a:effectLst>
+            <a:outerShdw blurRad="50760" dist="37674" dir="2700000" algn="tl" rotWithShape="0">
+              <a:srgbClr val="000000">
+                <a:alpha val="40000"/>
+              </a:srgbClr>
+            </a:outerShdw>
+          </a:effectLst>
+        </p:spPr>
+        <p:style>
+          <a:lnRef idx="2">
+            <a:schemeClr val="accent1">
+              <a:shade val="50000"/>
+            </a:schemeClr>
+          </a:lnRef>
+          <a:fillRef idx="1">
+            <a:schemeClr val="accent1"/>
+          </a:fillRef>
+          <a:effectRef idx="0">
+            <a:schemeClr val="accent1"/>
+          </a:effectRef>
+          <a:fontRef idx="minor"/>
+        </p:style>
+        <p:txBody>
+          <a:bodyPr lIns="56250" tIns="28125" rIns="56250" bIns="28125" anchor="ctr">
+            <a:noAutofit/>
+          </a:bodyPr>
+          <a:lstStyle/>
+          <a:p>
+            <a:pPr algn="ctr"/>
+            <a:r>
+              <a:rPr lang="en-US" sz="800" spc="-1" dirty="0" err="1">
+                <a:solidFill>
+                  <a:srgbClr val="FFFFFF"/>
+                </a:solidFill>
+                <a:latin typeface="Arial"/>
+              </a:rPr>
+              <a:t>Enet</a:t>
+            </a:r>
+            <a:r>
+              <a:rPr lang="en-US" sz="800" spc="-1" dirty="0">
+                <a:solidFill>
+                  <a:srgbClr val="FFFFFF"/>
+                </a:solidFill>
+                <a:latin typeface="Arial"/>
+              </a:rPr>
+              <a:t> LLD</a:t>
+            </a:r>
+            <a:endParaRPr lang="en-IN" sz="800" spc="-1" dirty="0">
+              <a:solidFill>
+                <a:srgbClr val="FFFFFF"/>
+              </a:solidFill>
+              <a:latin typeface="Arial"/>
+            </a:endParaRPr>
+          </a:p>
+        </p:txBody>
+      </p:sp>
+    </p:spTree>
+    <p:extLst>
+      <p:ext uri="{BB962C8B-B14F-4D97-AF65-F5344CB8AC3E}">
+        <p14:creationId xmlns:p14="http://schemas.microsoft.com/office/powerpoint/2010/main" val="896987402"/>
       </p:ext>
     </p:extLst>
   </p:cSld>

</xml_diff>